<commit_message>
Updated Presentation with Dan's Slides
</commit_message>
<xml_diff>
--- a/IST707_Wine_Quality_Prediction_Dec2021.pptx
+++ b/IST707_Wine_Quality_Prediction_Dec2021.pptx
@@ -16,6 +16,10 @@
     <p:sldId id="269" r:id="rId10"/>
     <p:sldId id="270" r:id="rId11"/>
     <p:sldId id="267" r:id="rId12"/>
+    <p:sldId id="271" r:id="rId13"/>
+    <p:sldId id="272" r:id="rId14"/>
+    <p:sldId id="273" r:id="rId15"/>
+    <p:sldId id="274" r:id="rId16"/>
   </p:sldIdLst>
   <p:sldSz cx="12192000" cy="6858000"/>
   <p:notesSz cx="6858000" cy="9144000"/>
@@ -120,6 +124,52 @@
     </p:ext>
   </p:extLst>
 </p:presentation>
+</file>
+
+<file path=ppt/authors.xml><?xml version="1.0" encoding="utf-8"?>
+<p188:authorLst xmlns:a="http://schemas.openxmlformats.org/drawingml/2006/main" xmlns:r="http://schemas.openxmlformats.org/officeDocument/2006/relationships" xmlns:p188="http://schemas.microsoft.com/office/powerpoint/2018/8/main">
+  <p188:author id="{2848F113-F418-5AB3-2F08-66DECC8A99D3}" name="Dan B" initials="DB" userId="94dffc5f35b4a0bd" providerId="Windows Live"/>
+</p188:authorLst>
+</file>
+
+<file path=ppt/comments/modernComment_112_23B2952A.xml><?xml version="1.0" encoding="utf-8"?>
+<p188:cmLst xmlns:a="http://schemas.openxmlformats.org/drawingml/2006/main" xmlns:r="http://schemas.openxmlformats.org/officeDocument/2006/relationships" xmlns:p188="http://schemas.microsoft.com/office/powerpoint/2018/8/main">
+  <p188:cm id="{099260B4-AC6D-4918-B777-20455E73753B}" authorId="{2848F113-F418-5AB3-2F08-66DECC8A99D3}" created="2021-12-14T00:02:18.533">
+    <ac:deMkLst xmlns:ac="http://schemas.microsoft.com/office/drawing/2013/main/command">
+      <pc:docMk xmlns:pc="http://schemas.microsoft.com/office/powerpoint/2013/main/command"/>
+      <pc:sldMk xmlns:pc="http://schemas.microsoft.com/office/powerpoint/2013/main/command" cId="598906154" sldId="274"/>
+      <ac:picMk id="3" creationId="{E994BA96-3250-4958-89E7-3DC3272BD2CB}"/>
+    </ac:deMkLst>
+    <p188:txBody>
+      <a:bodyPr/>
+      <a:lstStyle/>
+      <a:p>
+        <a:r>
+          <a:rPr lang="en-US"/>
+          <a:t>Red
+</a:t>
+        </a:r>
+      </a:p>
+    </p188:txBody>
+  </p188:cm>
+  <p188:cm id="{C70D6DED-5C5A-4CCE-942B-971BF7ED48F8}" authorId="{2848F113-F418-5AB3-2F08-66DECC8A99D3}" created="2021-12-14T00:03:13.547">
+    <ac:deMkLst xmlns:ac="http://schemas.microsoft.com/office/drawing/2013/main/command">
+      <pc:docMk xmlns:pc="http://schemas.microsoft.com/office/powerpoint/2013/main/command"/>
+      <pc:sldMk xmlns:pc="http://schemas.microsoft.com/office/powerpoint/2013/main/command" cId="598906154" sldId="274"/>
+      <ac:picMk id="5" creationId="{646C1AC8-C074-45FA-8F99-29991939236A}"/>
+    </ac:deMkLst>
+    <p188:txBody>
+      <a:bodyPr/>
+      <a:lstStyle/>
+      <a:p>
+        <a:r>
+          <a:rPr lang="en-US"/>
+          <a:t>White</a:t>
+        </a:r>
+      </a:p>
+    </p188:txBody>
+  </p188:cm>
+</p188:cmLst>
 </file>
 
 <file path=ppt/slideLayouts/slideLayout1.xml><?xml version="1.0" encoding="utf-8"?>
@@ -4951,6 +5001,2494 @@
 </p:sld>
 </file>
 
+<file path=ppt/slides/slide12.xml><?xml version="1.0" encoding="utf-8"?>
+<p:sld xmlns:a="http://schemas.openxmlformats.org/drawingml/2006/main" xmlns:r="http://schemas.openxmlformats.org/officeDocument/2006/relationships" xmlns:p="http://schemas.openxmlformats.org/presentationml/2006/main">
+  <p:cSld>
+    <p:spTree>
+      <p:nvGrpSpPr>
+        <p:cNvPr id="1" name=""/>
+        <p:cNvGrpSpPr/>
+        <p:nvPr/>
+      </p:nvGrpSpPr>
+      <p:grpSpPr>
+        <a:xfrm>
+          <a:off x="0" y="0"/>
+          <a:ext cx="0" cy="0"/>
+          <a:chOff x="0" y="0"/>
+          <a:chExt cx="0" cy="0"/>
+        </a:xfrm>
+      </p:grpSpPr>
+      <p:sp>
+        <p:nvSpPr>
+          <p:cNvPr id="2" name="TextBox 1">
+            <a:extLst>
+              <a:ext uri="{FF2B5EF4-FFF2-40B4-BE49-F238E27FC236}">
+                <a16:creationId xmlns:a16="http://schemas.microsoft.com/office/drawing/2014/main" id="{F8AC6117-E874-45E1-AAB1-A75D67D1D20B}"/>
+              </a:ext>
+            </a:extLst>
+          </p:cNvPr>
+          <p:cNvSpPr txBox="1"/>
+          <p:nvPr/>
+        </p:nvSpPr>
+        <p:spPr>
+          <a:xfrm>
+            <a:off x="3149456" y="822817"/>
+            <a:ext cx="5893088" cy="369332"/>
+          </a:xfrm>
+          <a:prstGeom prst="rect">
+            <a:avLst/>
+          </a:prstGeom>
+          <a:noFill/>
+        </p:spPr>
+        <p:txBody>
+          <a:bodyPr wrap="none" rtlCol="0">
+            <a:spAutoFit/>
+          </a:bodyPr>
+          <a:lstStyle/>
+          <a:p>
+            <a:pPr algn="ctr"/>
+            <a:r>
+              <a:rPr lang="en-US" dirty="0"/>
+              <a:t>Naïve Bayes Classifier – Python “scikit-learn” Implementation</a:t>
+            </a:r>
+          </a:p>
+        </p:txBody>
+      </p:sp>
+      <p:pic>
+        <p:nvPicPr>
+          <p:cNvPr id="4" name="Picture 3" descr="Chart&#10;&#10;Description automatically generated">
+            <a:extLst>
+              <a:ext uri="{FF2B5EF4-FFF2-40B4-BE49-F238E27FC236}">
+                <a16:creationId xmlns:a16="http://schemas.microsoft.com/office/drawing/2014/main" id="{9A8509C0-F3B4-4CDC-837C-40BE98935CF4}"/>
+              </a:ext>
+            </a:extLst>
+          </p:cNvPr>
+          <p:cNvPicPr>
+            <a:picLocks noChangeAspect="1"/>
+          </p:cNvPicPr>
+          <p:nvPr/>
+        </p:nvPicPr>
+        <p:blipFill>
+          <a:blip r:embed="rId2"/>
+          <a:stretch>
+            <a:fillRect/>
+          </a:stretch>
+        </p:blipFill>
+        <p:spPr>
+          <a:xfrm>
+            <a:off x="6015005" y="3069007"/>
+            <a:ext cx="2596845" cy="1731230"/>
+          </a:xfrm>
+          <a:prstGeom prst="rect">
+            <a:avLst/>
+          </a:prstGeom>
+        </p:spPr>
+      </p:pic>
+      <p:pic>
+        <p:nvPicPr>
+          <p:cNvPr id="6" name="Picture 5" descr="Chart, icon&#10;&#10;Description automatically generated">
+            <a:extLst>
+              <a:ext uri="{FF2B5EF4-FFF2-40B4-BE49-F238E27FC236}">
+                <a16:creationId xmlns:a16="http://schemas.microsoft.com/office/drawing/2014/main" id="{E230A72E-63C0-4EF6-A043-C0A3B9991EFC}"/>
+              </a:ext>
+            </a:extLst>
+          </p:cNvPr>
+          <p:cNvPicPr>
+            <a:picLocks noChangeAspect="1"/>
+          </p:cNvPicPr>
+          <p:nvPr/>
+        </p:nvPicPr>
+        <p:blipFill>
+          <a:blip r:embed="rId3"/>
+          <a:stretch>
+            <a:fillRect/>
+          </a:stretch>
+        </p:blipFill>
+        <p:spPr>
+          <a:xfrm>
+            <a:off x="6015006" y="4945865"/>
+            <a:ext cx="2596845" cy="1731230"/>
+          </a:xfrm>
+          <a:prstGeom prst="rect">
+            <a:avLst/>
+          </a:prstGeom>
+        </p:spPr>
+      </p:pic>
+      <p:pic>
+        <p:nvPicPr>
+          <p:cNvPr id="8" name="Picture 7" descr="Chart, scatter chart&#10;&#10;Description automatically generated">
+            <a:extLst>
+              <a:ext uri="{FF2B5EF4-FFF2-40B4-BE49-F238E27FC236}">
+                <a16:creationId xmlns:a16="http://schemas.microsoft.com/office/drawing/2014/main" id="{2A36A459-F642-4ECF-83EB-6C234350F8FB}"/>
+              </a:ext>
+            </a:extLst>
+          </p:cNvPr>
+          <p:cNvPicPr>
+            <a:picLocks noChangeAspect="1"/>
+          </p:cNvPicPr>
+          <p:nvPr/>
+        </p:nvPicPr>
+        <p:blipFill>
+          <a:blip r:embed="rId4"/>
+          <a:stretch>
+            <a:fillRect/>
+          </a:stretch>
+        </p:blipFill>
+        <p:spPr>
+          <a:xfrm>
+            <a:off x="8611852" y="3023816"/>
+            <a:ext cx="2596845" cy="1731230"/>
+          </a:xfrm>
+          <a:prstGeom prst="rect">
+            <a:avLst/>
+          </a:prstGeom>
+        </p:spPr>
+      </p:pic>
+      <p:pic>
+        <p:nvPicPr>
+          <p:cNvPr id="10" name="Picture 9" descr="Chart, scatter chart&#10;&#10;Description automatically generated">
+            <a:extLst>
+              <a:ext uri="{FF2B5EF4-FFF2-40B4-BE49-F238E27FC236}">
+                <a16:creationId xmlns:a16="http://schemas.microsoft.com/office/drawing/2014/main" id="{C02399B5-CC39-4B1A-9607-A720BDE74814}"/>
+              </a:ext>
+            </a:extLst>
+          </p:cNvPr>
+          <p:cNvPicPr>
+            <a:picLocks noChangeAspect="1"/>
+          </p:cNvPicPr>
+          <p:nvPr/>
+        </p:nvPicPr>
+        <p:blipFill>
+          <a:blip r:embed="rId5"/>
+          <a:stretch>
+            <a:fillRect/>
+          </a:stretch>
+        </p:blipFill>
+        <p:spPr>
+          <a:xfrm>
+            <a:off x="8611852" y="1192149"/>
+            <a:ext cx="2596845" cy="1731230"/>
+          </a:xfrm>
+          <a:prstGeom prst="rect">
+            <a:avLst/>
+          </a:prstGeom>
+        </p:spPr>
+      </p:pic>
+      <p:pic>
+        <p:nvPicPr>
+          <p:cNvPr id="12" name="Picture 11" descr="A picture containing icon&#10;&#10;Description automatically generated">
+            <a:extLst>
+              <a:ext uri="{FF2B5EF4-FFF2-40B4-BE49-F238E27FC236}">
+                <a16:creationId xmlns:a16="http://schemas.microsoft.com/office/drawing/2014/main" id="{B3A9D77D-DF71-4AE5-B9F6-6A29A44F939A}"/>
+              </a:ext>
+            </a:extLst>
+          </p:cNvPr>
+          <p:cNvPicPr>
+            <a:picLocks noChangeAspect="1"/>
+          </p:cNvPicPr>
+          <p:nvPr/>
+        </p:nvPicPr>
+        <p:blipFill>
+          <a:blip r:embed="rId6"/>
+          <a:stretch>
+            <a:fillRect/>
+          </a:stretch>
+        </p:blipFill>
+        <p:spPr>
+          <a:xfrm>
+            <a:off x="6015007" y="1192149"/>
+            <a:ext cx="2596845" cy="1731230"/>
+          </a:xfrm>
+          <a:prstGeom prst="rect">
+            <a:avLst/>
+          </a:prstGeom>
+        </p:spPr>
+      </p:pic>
+      <p:pic>
+        <p:nvPicPr>
+          <p:cNvPr id="14" name="Picture 13" descr="Chart&#10;&#10;Description automatically generated">
+            <a:extLst>
+              <a:ext uri="{FF2B5EF4-FFF2-40B4-BE49-F238E27FC236}">
+                <a16:creationId xmlns:a16="http://schemas.microsoft.com/office/drawing/2014/main" id="{B75055E9-91AF-4C13-AFF6-EDC2F0145AD9}"/>
+              </a:ext>
+            </a:extLst>
+          </p:cNvPr>
+          <p:cNvPicPr>
+            <a:picLocks noChangeAspect="1"/>
+          </p:cNvPicPr>
+          <p:nvPr/>
+        </p:nvPicPr>
+        <p:blipFill>
+          <a:blip r:embed="rId7"/>
+          <a:stretch>
+            <a:fillRect/>
+          </a:stretch>
+        </p:blipFill>
+        <p:spPr>
+          <a:xfrm>
+            <a:off x="3346238" y="4945865"/>
+            <a:ext cx="2596845" cy="1731230"/>
+          </a:xfrm>
+          <a:prstGeom prst="rect">
+            <a:avLst/>
+          </a:prstGeom>
+        </p:spPr>
+      </p:pic>
+      <p:pic>
+        <p:nvPicPr>
+          <p:cNvPr id="16" name="Picture 15" descr="Chart&#10;&#10;Description automatically generated">
+            <a:extLst>
+              <a:ext uri="{FF2B5EF4-FFF2-40B4-BE49-F238E27FC236}">
+                <a16:creationId xmlns:a16="http://schemas.microsoft.com/office/drawing/2014/main" id="{78FF8AA2-A127-4662-BD1A-1FF83258997B}"/>
+              </a:ext>
+            </a:extLst>
+          </p:cNvPr>
+          <p:cNvPicPr>
+            <a:picLocks noChangeAspect="1"/>
+          </p:cNvPicPr>
+          <p:nvPr/>
+        </p:nvPicPr>
+        <p:blipFill>
+          <a:blip r:embed="rId8"/>
+          <a:stretch>
+            <a:fillRect/>
+          </a:stretch>
+        </p:blipFill>
+        <p:spPr>
+          <a:xfrm>
+            <a:off x="3418162" y="3113753"/>
+            <a:ext cx="2596845" cy="1731230"/>
+          </a:xfrm>
+          <a:prstGeom prst="rect">
+            <a:avLst/>
+          </a:prstGeom>
+        </p:spPr>
+      </p:pic>
+      <p:pic>
+        <p:nvPicPr>
+          <p:cNvPr id="18" name="Picture 17">
+            <a:extLst>
+              <a:ext uri="{FF2B5EF4-FFF2-40B4-BE49-F238E27FC236}">
+                <a16:creationId xmlns:a16="http://schemas.microsoft.com/office/drawing/2014/main" id="{3187320B-30AF-4D31-BF56-7F7ADCB7ED7A}"/>
+              </a:ext>
+            </a:extLst>
+          </p:cNvPr>
+          <p:cNvPicPr>
+            <a:picLocks noChangeAspect="1"/>
+          </p:cNvPicPr>
+          <p:nvPr/>
+        </p:nvPicPr>
+        <p:blipFill>
+          <a:blip r:embed="rId9"/>
+          <a:stretch>
+            <a:fillRect/>
+          </a:stretch>
+        </p:blipFill>
+        <p:spPr>
+          <a:xfrm>
+            <a:off x="3340023" y="1192149"/>
+            <a:ext cx="2596845" cy="1731230"/>
+          </a:xfrm>
+          <a:prstGeom prst="rect">
+            <a:avLst/>
+          </a:prstGeom>
+        </p:spPr>
+      </p:pic>
+      <p:pic>
+        <p:nvPicPr>
+          <p:cNvPr id="20" name="Picture 19" descr="A picture containing chart&#10;&#10;Description automatically generated">
+            <a:extLst>
+              <a:ext uri="{FF2B5EF4-FFF2-40B4-BE49-F238E27FC236}">
+                <a16:creationId xmlns:a16="http://schemas.microsoft.com/office/drawing/2014/main" id="{BC07CFE3-8B95-487E-956C-240A67222F8B}"/>
+              </a:ext>
+            </a:extLst>
+          </p:cNvPr>
+          <p:cNvPicPr>
+            <a:picLocks noChangeAspect="1"/>
+          </p:cNvPicPr>
+          <p:nvPr/>
+        </p:nvPicPr>
+        <p:blipFill>
+          <a:blip r:embed="rId10"/>
+          <a:stretch>
+            <a:fillRect/>
+          </a:stretch>
+        </p:blipFill>
+        <p:spPr>
+          <a:xfrm>
+            <a:off x="821317" y="4889728"/>
+            <a:ext cx="2596845" cy="1731230"/>
+          </a:xfrm>
+          <a:prstGeom prst="rect">
+            <a:avLst/>
+          </a:prstGeom>
+        </p:spPr>
+      </p:pic>
+      <p:pic>
+        <p:nvPicPr>
+          <p:cNvPr id="22" name="Picture 21" descr="Chart, scatter chart&#10;&#10;Description automatically generated">
+            <a:extLst>
+              <a:ext uri="{FF2B5EF4-FFF2-40B4-BE49-F238E27FC236}">
+                <a16:creationId xmlns:a16="http://schemas.microsoft.com/office/drawing/2014/main" id="{26B05CD8-C6FA-4E3B-BDED-EECF76501674}"/>
+              </a:ext>
+            </a:extLst>
+          </p:cNvPr>
+          <p:cNvPicPr>
+            <a:picLocks noChangeAspect="1"/>
+          </p:cNvPicPr>
+          <p:nvPr/>
+        </p:nvPicPr>
+        <p:blipFill>
+          <a:blip r:embed="rId11"/>
+          <a:stretch>
+            <a:fillRect/>
+          </a:stretch>
+        </p:blipFill>
+        <p:spPr>
+          <a:xfrm>
+            <a:off x="887021" y="3069007"/>
+            <a:ext cx="2596845" cy="1731230"/>
+          </a:xfrm>
+          <a:prstGeom prst="rect">
+            <a:avLst/>
+          </a:prstGeom>
+        </p:spPr>
+      </p:pic>
+      <p:pic>
+        <p:nvPicPr>
+          <p:cNvPr id="24" name="Picture 23" descr="Chart&#10;&#10;Description automatically generated">
+            <a:extLst>
+              <a:ext uri="{FF2B5EF4-FFF2-40B4-BE49-F238E27FC236}">
+                <a16:creationId xmlns:a16="http://schemas.microsoft.com/office/drawing/2014/main" id="{BBC21D6F-5ABD-4003-B2B6-C25C4728855A}"/>
+              </a:ext>
+            </a:extLst>
+          </p:cNvPr>
+          <p:cNvPicPr>
+            <a:picLocks noChangeAspect="1"/>
+          </p:cNvPicPr>
+          <p:nvPr/>
+        </p:nvPicPr>
+        <p:blipFill>
+          <a:blip r:embed="rId12"/>
+          <a:stretch>
+            <a:fillRect/>
+          </a:stretch>
+        </p:blipFill>
+        <p:spPr>
+          <a:xfrm>
+            <a:off x="887021" y="1192149"/>
+            <a:ext cx="2596845" cy="1731230"/>
+          </a:xfrm>
+          <a:prstGeom prst="rect">
+            <a:avLst/>
+          </a:prstGeom>
+        </p:spPr>
+      </p:pic>
+    </p:spTree>
+    <p:extLst>
+      <p:ext uri="{BB962C8B-B14F-4D97-AF65-F5344CB8AC3E}">
+        <p14:creationId xmlns:p14="http://schemas.microsoft.com/office/powerpoint/2010/main" val="4155776396"/>
+      </p:ext>
+    </p:extLst>
+  </p:cSld>
+  <p:clrMapOvr>
+    <a:masterClrMapping/>
+  </p:clrMapOvr>
+</p:sld>
+</file>
+
+<file path=ppt/slides/slide13.xml><?xml version="1.0" encoding="utf-8"?>
+<p:sld xmlns:a="http://schemas.openxmlformats.org/drawingml/2006/main" xmlns:r="http://schemas.openxmlformats.org/officeDocument/2006/relationships" xmlns:p="http://schemas.openxmlformats.org/presentationml/2006/main">
+  <p:cSld>
+    <p:bg>
+      <p:bgPr>
+        <a:solidFill>
+          <a:schemeClr val="bg1"/>
+        </a:solidFill>
+        <a:effectLst/>
+      </p:bgPr>
+    </p:bg>
+    <p:spTree>
+      <p:nvGrpSpPr>
+        <p:cNvPr id="1" name=""/>
+        <p:cNvGrpSpPr/>
+        <p:nvPr/>
+      </p:nvGrpSpPr>
+      <p:grpSpPr>
+        <a:xfrm>
+          <a:off x="0" y="0"/>
+          <a:ext cx="0" cy="0"/>
+          <a:chOff x="0" y="0"/>
+          <a:chExt cx="0" cy="0"/>
+        </a:xfrm>
+      </p:grpSpPr>
+      <p:sp>
+        <p:nvSpPr>
+          <p:cNvPr id="29" name="Rectangle 28">
+            <a:extLst>
+              <a:ext uri="{FF2B5EF4-FFF2-40B4-BE49-F238E27FC236}">
+                <a16:creationId xmlns:a16="http://schemas.microsoft.com/office/drawing/2014/main" id="{1BB1D3B0-1E2E-48E2-ACCC-EE147A9A0CE0}"/>
+              </a:ext>
+              <a:ext uri="{C183D7F6-B498-43B3-948B-1728B52AA6E4}">
+                <adec:decorative xmlns:adec="http://schemas.microsoft.com/office/drawing/2017/decorative" val="1"/>
+              </a:ext>
+            </a:extLst>
+          </p:cNvPr>
+          <p:cNvSpPr>
+            <a:spLocks noGrp="1" noRot="1" noChangeAspect="1" noMove="1" noResize="1" noEditPoints="1" noAdjustHandles="1" noChangeArrowheads="1" noChangeShapeType="1" noTextEdit="1"/>
+          </p:cNvSpPr>
+          <p:nvPr>
+            <p:extLst>
+              <p:ext uri="{386F3935-93C4-4BCD-93E2-E3B085C9AB24}">
+                <p16:designElem xmlns:p16="http://schemas.microsoft.com/office/powerpoint/2015/main" val="1"/>
+              </p:ext>
+            </p:extLst>
+          </p:nvPr>
+        </p:nvSpPr>
+        <p:spPr>
+          <a:xfrm>
+            <a:off x="446534" y="457200"/>
+            <a:ext cx="3703320" cy="94997"/>
+          </a:xfrm>
+          <a:prstGeom prst="rect">
+            <a:avLst/>
+          </a:prstGeom>
+          <a:solidFill>
+            <a:schemeClr val="accent1"/>
+          </a:solidFill>
+          <a:ln>
+            <a:noFill/>
+          </a:ln>
+          <a:effectLst/>
+        </p:spPr>
+        <p:style>
+          <a:lnRef idx="1">
+            <a:schemeClr val="accent1"/>
+          </a:lnRef>
+          <a:fillRef idx="3">
+            <a:schemeClr val="accent1"/>
+          </a:fillRef>
+          <a:effectRef idx="2">
+            <a:schemeClr val="accent1"/>
+          </a:effectRef>
+          <a:fontRef idx="minor">
+            <a:schemeClr val="lt1"/>
+          </a:fontRef>
+        </p:style>
+      </p:sp>
+      <p:sp>
+        <p:nvSpPr>
+          <p:cNvPr id="31" name="Rectangle 30">
+            <a:extLst>
+              <a:ext uri="{FF2B5EF4-FFF2-40B4-BE49-F238E27FC236}">
+                <a16:creationId xmlns:a16="http://schemas.microsoft.com/office/drawing/2014/main" id="{4BB8B191-5BC6-486A-8E6E-13B1C9EEE83D}"/>
+              </a:ext>
+              <a:ext uri="{C183D7F6-B498-43B3-948B-1728B52AA6E4}">
+                <adec:decorative xmlns:adec="http://schemas.microsoft.com/office/drawing/2017/decorative" val="1"/>
+              </a:ext>
+            </a:extLst>
+          </p:cNvPr>
+          <p:cNvSpPr>
+            <a:spLocks noGrp="1" noRot="1" noChangeAspect="1" noMove="1" noResize="1" noEditPoints="1" noAdjustHandles="1" noChangeArrowheads="1" noChangeShapeType="1" noTextEdit="1"/>
+          </p:cNvSpPr>
+          <p:nvPr>
+            <p:extLst>
+              <p:ext uri="{386F3935-93C4-4BCD-93E2-E3B085C9AB24}">
+                <p16:designElem xmlns:p16="http://schemas.microsoft.com/office/powerpoint/2015/main" val="1"/>
+              </p:ext>
+            </p:extLst>
+          </p:nvPr>
+        </p:nvSpPr>
+        <p:spPr>
+          <a:xfrm>
+            <a:off x="8042147" y="453643"/>
+            <a:ext cx="3703320" cy="98554"/>
+          </a:xfrm>
+          <a:prstGeom prst="rect">
+            <a:avLst/>
+          </a:prstGeom>
+          <a:solidFill>
+            <a:schemeClr val="accent4"/>
+          </a:solidFill>
+          <a:ln>
+            <a:noFill/>
+          </a:ln>
+          <a:effectLst/>
+        </p:spPr>
+        <p:style>
+          <a:lnRef idx="1">
+            <a:schemeClr val="accent1"/>
+          </a:lnRef>
+          <a:fillRef idx="3">
+            <a:schemeClr val="accent1"/>
+          </a:fillRef>
+          <a:effectRef idx="2">
+            <a:schemeClr val="accent1"/>
+          </a:effectRef>
+          <a:fontRef idx="minor">
+            <a:schemeClr val="lt1"/>
+          </a:fontRef>
+        </p:style>
+      </p:sp>
+      <p:sp>
+        <p:nvSpPr>
+          <p:cNvPr id="33" name="Rectangle 32">
+            <a:extLst>
+              <a:ext uri="{FF2B5EF4-FFF2-40B4-BE49-F238E27FC236}">
+                <a16:creationId xmlns:a16="http://schemas.microsoft.com/office/drawing/2014/main" id="{06E3DE27-4115-4B5D-A9DB-3C7CDC82B121}"/>
+              </a:ext>
+              <a:ext uri="{C183D7F6-B498-43B3-948B-1728B52AA6E4}">
+                <adec:decorative xmlns:adec="http://schemas.microsoft.com/office/drawing/2017/decorative" val="1"/>
+              </a:ext>
+            </a:extLst>
+          </p:cNvPr>
+          <p:cNvSpPr>
+            <a:spLocks noGrp="1" noRot="1" noChangeAspect="1" noMove="1" noResize="1" noEditPoints="1" noAdjustHandles="1" noChangeArrowheads="1" noChangeShapeType="1" noTextEdit="1"/>
+          </p:cNvSpPr>
+          <p:nvPr>
+            <p:extLst>
+              <p:ext uri="{386F3935-93C4-4BCD-93E2-E3B085C9AB24}">
+                <p16:designElem xmlns:p16="http://schemas.microsoft.com/office/powerpoint/2015/main" val="1"/>
+              </p:ext>
+            </p:extLst>
+          </p:nvPr>
+        </p:nvSpPr>
+        <p:spPr>
+          <a:xfrm>
+            <a:off x="4241830" y="457200"/>
+            <a:ext cx="3703320" cy="91440"/>
+          </a:xfrm>
+          <a:prstGeom prst="rect">
+            <a:avLst/>
+          </a:prstGeom>
+          <a:solidFill>
+            <a:schemeClr val="accent2"/>
+          </a:solidFill>
+          <a:ln>
+            <a:noFill/>
+          </a:ln>
+          <a:effectLst/>
+        </p:spPr>
+        <p:style>
+          <a:lnRef idx="1">
+            <a:schemeClr val="accent1"/>
+          </a:lnRef>
+          <a:fillRef idx="3">
+            <a:schemeClr val="accent1"/>
+          </a:fillRef>
+          <a:effectRef idx="2">
+            <a:schemeClr val="accent1"/>
+          </a:effectRef>
+          <a:fontRef idx="minor">
+            <a:schemeClr val="lt1"/>
+          </a:fontRef>
+        </p:style>
+      </p:sp>
+      <p:sp>
+        <p:nvSpPr>
+          <p:cNvPr id="35" name="Rectangle 34">
+            <a:extLst>
+              <a:ext uri="{FF2B5EF4-FFF2-40B4-BE49-F238E27FC236}">
+                <a16:creationId xmlns:a16="http://schemas.microsoft.com/office/drawing/2014/main" id="{FC4E03DE-1C4E-4337-B54B-247C1E94822D}"/>
+              </a:ext>
+              <a:ext uri="{C183D7F6-B498-43B3-948B-1728B52AA6E4}">
+                <adec:decorative xmlns:adec="http://schemas.microsoft.com/office/drawing/2017/decorative" val="1"/>
+              </a:ext>
+            </a:extLst>
+          </p:cNvPr>
+          <p:cNvSpPr>
+            <a:spLocks noGrp="1" noRot="1" noChangeAspect="1" noMove="1" noResize="1" noEditPoints="1" noAdjustHandles="1" noChangeArrowheads="1" noChangeShapeType="1" noTextEdit="1"/>
+          </p:cNvSpPr>
+          <p:nvPr>
+            <p:extLst>
+              <p:ext uri="{386F3935-93C4-4BCD-93E2-E3B085C9AB24}">
+                <p16:designElem xmlns:p16="http://schemas.microsoft.com/office/powerpoint/2015/main" val="1"/>
+              </p:ext>
+            </p:extLst>
+          </p:nvPr>
+        </p:nvSpPr>
+        <p:spPr>
+          <a:xfrm>
+            <a:off x="440286" y="614407"/>
+            <a:ext cx="11309338" cy="1189298"/>
+          </a:xfrm>
+          <a:prstGeom prst="rect">
+            <a:avLst/>
+          </a:prstGeom>
+          <a:solidFill>
+            <a:schemeClr val="accent1"/>
+          </a:solidFill>
+          <a:ln>
+            <a:noFill/>
+          </a:ln>
+          <a:effectLst/>
+        </p:spPr>
+        <p:style>
+          <a:lnRef idx="1">
+            <a:schemeClr val="accent1"/>
+          </a:lnRef>
+          <a:fillRef idx="3">
+            <a:schemeClr val="accent1"/>
+          </a:fillRef>
+          <a:effectRef idx="2">
+            <a:schemeClr val="accent1"/>
+          </a:effectRef>
+          <a:fontRef idx="minor">
+            <a:schemeClr val="lt1"/>
+          </a:fontRef>
+        </p:style>
+      </p:sp>
+      <p:sp useBgFill="1">
+        <p:nvSpPr>
+          <p:cNvPr id="37" name="Rectangle 36">
+            <a:extLst>
+              <a:ext uri="{FF2B5EF4-FFF2-40B4-BE49-F238E27FC236}">
+                <a16:creationId xmlns:a16="http://schemas.microsoft.com/office/drawing/2014/main" id="{B1CC0937-4B54-4AB8-9605-7DEED999380B}"/>
+              </a:ext>
+              <a:ext uri="{C183D7F6-B498-43B3-948B-1728B52AA6E4}">
+                <adec:decorative xmlns:adec="http://schemas.microsoft.com/office/drawing/2017/decorative" val="1"/>
+              </a:ext>
+            </a:extLst>
+          </p:cNvPr>
+          <p:cNvSpPr>
+            <a:spLocks noGrp="1" noRot="1" noChangeAspect="1" noMove="1" noResize="1" noEditPoints="1" noAdjustHandles="1" noChangeArrowheads="1" noChangeShapeType="1" noTextEdit="1"/>
+          </p:cNvSpPr>
+          <p:nvPr>
+            <p:extLst>
+              <p:ext uri="{386F3935-93C4-4BCD-93E2-E3B085C9AB24}">
+                <p16:designElem xmlns:p16="http://schemas.microsoft.com/office/powerpoint/2015/main" val="1"/>
+              </p:ext>
+            </p:extLst>
+          </p:nvPr>
+        </p:nvSpPr>
+        <p:spPr>
+          <a:xfrm>
+            <a:off x="0" y="548640"/>
+            <a:ext cx="12192000" cy="6309360"/>
+          </a:xfrm>
+          <a:prstGeom prst="rect">
+            <a:avLst/>
+          </a:prstGeom>
+          <a:ln>
+            <a:noFill/>
+          </a:ln>
+        </p:spPr>
+        <p:style>
+          <a:lnRef idx="2">
+            <a:schemeClr val="accent1">
+              <a:shade val="50000"/>
+            </a:schemeClr>
+          </a:lnRef>
+          <a:fillRef idx="1">
+            <a:schemeClr val="accent1"/>
+          </a:fillRef>
+          <a:effectRef idx="0">
+            <a:schemeClr val="accent1"/>
+          </a:effectRef>
+          <a:fontRef idx="minor">
+            <a:schemeClr val="lt1"/>
+          </a:fontRef>
+        </p:style>
+        <p:txBody>
+          <a:bodyPr rtlCol="0" anchor="ctr"/>
+          <a:lstStyle/>
+          <a:p>
+            <a:pPr algn="ctr"/>
+            <a:endParaRPr lang="en-US"/>
+          </a:p>
+        </p:txBody>
+      </p:sp>
+      <p:sp>
+        <p:nvSpPr>
+          <p:cNvPr id="39" name="Rectangle 38">
+            <a:extLst>
+              <a:ext uri="{FF2B5EF4-FFF2-40B4-BE49-F238E27FC236}">
+                <a16:creationId xmlns:a16="http://schemas.microsoft.com/office/drawing/2014/main" id="{BE3EDEA1-97CC-41C2-BE54-EA64ACE7F97E}"/>
+              </a:ext>
+              <a:ext uri="{C183D7F6-B498-43B3-948B-1728B52AA6E4}">
+                <adec:decorative xmlns:adec="http://schemas.microsoft.com/office/drawing/2017/decorative" val="1"/>
+              </a:ext>
+            </a:extLst>
+          </p:cNvPr>
+          <p:cNvSpPr>
+            <a:spLocks noGrp="1" noRot="1" noChangeAspect="1" noMove="1" noResize="1" noEditPoints="1" noAdjustHandles="1" noChangeArrowheads="1" noChangeShapeType="1" noTextEdit="1"/>
+          </p:cNvSpPr>
+          <p:nvPr>
+            <p:extLst>
+              <p:ext uri="{386F3935-93C4-4BCD-93E2-E3B085C9AB24}">
+                <p16:designElem xmlns:p16="http://schemas.microsoft.com/office/powerpoint/2015/main" val="1"/>
+              </p:ext>
+            </p:extLst>
+          </p:nvPr>
+        </p:nvSpPr>
+        <p:spPr>
+          <a:xfrm>
+            <a:off x="4241830" y="614407"/>
+            <a:ext cx="7507794" cy="1189298"/>
+          </a:xfrm>
+          <a:prstGeom prst="rect">
+            <a:avLst/>
+          </a:prstGeom>
+          <a:solidFill>
+            <a:schemeClr val="accent1"/>
+          </a:solidFill>
+          <a:ln>
+            <a:noFill/>
+          </a:ln>
+          <a:effectLst/>
+        </p:spPr>
+        <p:style>
+          <a:lnRef idx="1">
+            <a:schemeClr val="accent1"/>
+          </a:lnRef>
+          <a:fillRef idx="3">
+            <a:schemeClr val="accent1"/>
+          </a:fillRef>
+          <a:effectRef idx="2">
+            <a:schemeClr val="accent1"/>
+          </a:effectRef>
+          <a:fontRef idx="minor">
+            <a:schemeClr val="lt1"/>
+          </a:fontRef>
+        </p:style>
+      </p:sp>
+      <p:sp>
+        <p:nvSpPr>
+          <p:cNvPr id="41" name="Rectangle 40">
+            <a:extLst>
+              <a:ext uri="{FF2B5EF4-FFF2-40B4-BE49-F238E27FC236}">
+                <a16:creationId xmlns:a16="http://schemas.microsoft.com/office/drawing/2014/main" id="{9926A5DB-A90A-4941-81F5-DF0E44A29719}"/>
+              </a:ext>
+              <a:ext uri="{C183D7F6-B498-43B3-948B-1728B52AA6E4}">
+                <adec:decorative xmlns:adec="http://schemas.microsoft.com/office/drawing/2017/decorative" val="1"/>
+              </a:ext>
+            </a:extLst>
+          </p:cNvPr>
+          <p:cNvSpPr>
+            <a:spLocks noGrp="1" noRot="1" noChangeAspect="1" noMove="1" noResize="1" noEditPoints="1" noAdjustHandles="1" noChangeArrowheads="1" noChangeShapeType="1" noTextEdit="1"/>
+          </p:cNvSpPr>
+          <p:nvPr>
+            <p:extLst>
+              <p:ext uri="{386F3935-93C4-4BCD-93E2-E3B085C9AB24}">
+                <p16:designElem xmlns:p16="http://schemas.microsoft.com/office/powerpoint/2015/main" val="1"/>
+              </p:ext>
+            </p:extLst>
+          </p:nvPr>
+        </p:nvSpPr>
+        <p:spPr>
+          <a:xfrm>
+            <a:off x="454391" y="641102"/>
+            <a:ext cx="3695019" cy="2827037"/>
+          </a:xfrm>
+          <a:prstGeom prst="rect">
+            <a:avLst/>
+          </a:prstGeom>
+          <a:noFill/>
+          <a:ln w="19050">
+            <a:solidFill>
+              <a:schemeClr val="tx2"/>
+            </a:solidFill>
+          </a:ln>
+        </p:spPr>
+        <p:style>
+          <a:lnRef idx="2">
+            <a:schemeClr val="accent1">
+              <a:shade val="50000"/>
+            </a:schemeClr>
+          </a:lnRef>
+          <a:fillRef idx="1">
+            <a:schemeClr val="accent1"/>
+          </a:fillRef>
+          <a:effectRef idx="0">
+            <a:schemeClr val="accent1"/>
+          </a:effectRef>
+          <a:fontRef idx="minor">
+            <a:schemeClr val="lt1"/>
+          </a:fontRef>
+        </p:style>
+        <p:txBody>
+          <a:bodyPr rtlCol="0" anchor="ctr"/>
+          <a:lstStyle/>
+          <a:p>
+            <a:pPr algn="ctr"/>
+            <a:endParaRPr lang="en-US"/>
+          </a:p>
+        </p:txBody>
+      </p:sp>
+      <p:pic>
+        <p:nvPicPr>
+          <p:cNvPr id="6" name="Picture 5" descr="Graphical user interface&#10;&#10;Description automatically generated with low confidence">
+            <a:extLst>
+              <a:ext uri="{FF2B5EF4-FFF2-40B4-BE49-F238E27FC236}">
+                <a16:creationId xmlns:a16="http://schemas.microsoft.com/office/drawing/2014/main" id="{36DE858F-77BC-465B-98DE-2921EF61E18D}"/>
+              </a:ext>
+            </a:extLst>
+          </p:cNvPr>
+          <p:cNvPicPr>
+            <a:picLocks noChangeAspect="1"/>
+          </p:cNvPicPr>
+          <p:nvPr/>
+        </p:nvPicPr>
+        <p:blipFill>
+          <a:blip r:embed="rId2"/>
+          <a:stretch>
+            <a:fillRect/>
+          </a:stretch>
+        </p:blipFill>
+        <p:spPr>
+          <a:xfrm>
+            <a:off x="570813" y="778502"/>
+            <a:ext cx="3671017" cy="2447344"/>
+          </a:xfrm>
+          <a:prstGeom prst="rect">
+            <a:avLst/>
+          </a:prstGeom>
+        </p:spPr>
+      </p:pic>
+      <p:pic>
+        <p:nvPicPr>
+          <p:cNvPr id="4" name="Picture 3" descr="Chart, calendar, treemap chart&#10;&#10;Description automatically generated">
+            <a:extLst>
+              <a:ext uri="{FF2B5EF4-FFF2-40B4-BE49-F238E27FC236}">
+                <a16:creationId xmlns:a16="http://schemas.microsoft.com/office/drawing/2014/main" id="{920F6945-8AC1-4F9B-9145-9ECB395053D8}"/>
+              </a:ext>
+            </a:extLst>
+          </p:cNvPr>
+          <p:cNvPicPr>
+            <a:picLocks noChangeAspect="1"/>
+          </p:cNvPicPr>
+          <p:nvPr/>
+        </p:nvPicPr>
+        <p:blipFill>
+          <a:blip r:embed="rId3"/>
+          <a:stretch>
+            <a:fillRect/>
+          </a:stretch>
+        </p:blipFill>
+        <p:spPr>
+          <a:xfrm>
+            <a:off x="785870" y="3429000"/>
+            <a:ext cx="3032063" cy="3032063"/>
+          </a:xfrm>
+          <a:prstGeom prst="rect">
+            <a:avLst/>
+          </a:prstGeom>
+        </p:spPr>
+      </p:pic>
+      <p:sp>
+        <p:nvSpPr>
+          <p:cNvPr id="43" name="Rectangle 42">
+            <a:extLst>
+              <a:ext uri="{FF2B5EF4-FFF2-40B4-BE49-F238E27FC236}">
+                <a16:creationId xmlns:a16="http://schemas.microsoft.com/office/drawing/2014/main" id="{AB1B71B9-532D-4BBD-BEBA-D028ACC08316}"/>
+              </a:ext>
+              <a:ext uri="{C183D7F6-B498-43B3-948B-1728B52AA6E4}">
+                <adec:decorative xmlns:adec="http://schemas.microsoft.com/office/drawing/2017/decorative" val="1"/>
+              </a:ext>
+            </a:extLst>
+          </p:cNvPr>
+          <p:cNvSpPr>
+            <a:spLocks noGrp="1" noRot="1" noChangeAspect="1" noMove="1" noResize="1" noEditPoints="1" noAdjustHandles="1" noChangeArrowheads="1" noChangeShapeType="1" noTextEdit="1"/>
+          </p:cNvSpPr>
+          <p:nvPr>
+            <p:extLst>
+              <p:ext uri="{386F3935-93C4-4BCD-93E2-E3B085C9AB24}">
+                <p16:designElem xmlns:p16="http://schemas.microsoft.com/office/powerpoint/2015/main" val="1"/>
+              </p:ext>
+            </p:extLst>
+          </p:nvPr>
+        </p:nvSpPr>
+        <p:spPr>
+          <a:xfrm>
+            <a:off x="455134" y="3557674"/>
+            <a:ext cx="3695019" cy="2827037"/>
+          </a:xfrm>
+          <a:prstGeom prst="rect">
+            <a:avLst/>
+          </a:prstGeom>
+          <a:noFill/>
+          <a:ln w="19050">
+            <a:solidFill>
+              <a:schemeClr val="tx2"/>
+            </a:solidFill>
+          </a:ln>
+        </p:spPr>
+        <p:style>
+          <a:lnRef idx="2">
+            <a:schemeClr val="accent1">
+              <a:shade val="50000"/>
+            </a:schemeClr>
+          </a:lnRef>
+          <a:fillRef idx="1">
+            <a:schemeClr val="accent1"/>
+          </a:fillRef>
+          <a:effectRef idx="0">
+            <a:schemeClr val="accent1"/>
+          </a:effectRef>
+          <a:fontRef idx="minor">
+            <a:schemeClr val="lt1"/>
+          </a:fontRef>
+        </p:style>
+        <p:txBody>
+          <a:bodyPr rtlCol="0" anchor="ctr"/>
+          <a:lstStyle/>
+          <a:p>
+            <a:pPr algn="ctr"/>
+            <a:endParaRPr lang="en-US"/>
+          </a:p>
+        </p:txBody>
+      </p:sp>
+      <p:sp>
+        <p:nvSpPr>
+          <p:cNvPr id="2" name="TextBox 1">
+            <a:extLst>
+              <a:ext uri="{FF2B5EF4-FFF2-40B4-BE49-F238E27FC236}">
+                <a16:creationId xmlns:a16="http://schemas.microsoft.com/office/drawing/2014/main" id="{8480A20F-635F-4EFF-8801-541F6DFFBFED}"/>
+              </a:ext>
+            </a:extLst>
+          </p:cNvPr>
+          <p:cNvSpPr txBox="1"/>
+          <p:nvPr/>
+        </p:nvSpPr>
+        <p:spPr>
+          <a:xfrm>
+            <a:off x="4401849" y="2180496"/>
+            <a:ext cx="7208957" cy="4045683"/>
+          </a:xfrm>
+          <a:prstGeom prst="rect">
+            <a:avLst/>
+          </a:prstGeom>
+        </p:spPr>
+        <p:txBody>
+          <a:bodyPr vert="horz" lIns="91440" tIns="45720" rIns="91440" bIns="45720" rtlCol="0" anchor="ctr">
+            <a:normAutofit/>
+          </a:bodyPr>
+          <a:lstStyle/>
+          <a:p>
+            <a:pPr>
+              <a:spcBef>
+                <a:spcPct val="20000"/>
+              </a:spcBef>
+              <a:spcAft>
+                <a:spcPts val="600"/>
+              </a:spcAft>
+              <a:buClr>
+                <a:schemeClr val="accent2"/>
+              </a:buClr>
+              <a:buSzPct val="92000"/>
+              <a:buFont typeface="Wingdings 2" panose="05020102010507070707" pitchFamily="18" charset="2"/>
+              <a:buChar char=""/>
+            </a:pPr>
+            <a:r>
+              <a:rPr lang="en-US" dirty="0">
+                <a:solidFill>
+                  <a:schemeClr val="tx2"/>
+                </a:solidFill>
+              </a:rPr>
+              <a:t>Explored Attributes by Wine Quality (Previous Slide)</a:t>
+            </a:r>
+          </a:p>
+          <a:p>
+            <a:pPr>
+              <a:spcBef>
+                <a:spcPct val="20000"/>
+              </a:spcBef>
+              <a:spcAft>
+                <a:spcPts val="600"/>
+              </a:spcAft>
+              <a:buClr>
+                <a:schemeClr val="accent2"/>
+              </a:buClr>
+              <a:buSzPct val="92000"/>
+              <a:buFont typeface="Wingdings 2" panose="05020102010507070707" pitchFamily="18" charset="2"/>
+              <a:buChar char=""/>
+            </a:pPr>
+            <a:r>
+              <a:rPr lang="en-US" dirty="0">
+                <a:solidFill>
+                  <a:schemeClr val="tx2"/>
+                </a:solidFill>
+              </a:rPr>
+              <a:t>Explored Attributes by Density (Seaborn lib)</a:t>
+            </a:r>
+          </a:p>
+          <a:p>
+            <a:pPr>
+              <a:spcBef>
+                <a:spcPct val="20000"/>
+              </a:spcBef>
+              <a:spcAft>
+                <a:spcPts val="600"/>
+              </a:spcAft>
+              <a:buClr>
+                <a:schemeClr val="accent2"/>
+              </a:buClr>
+              <a:buSzPct val="92000"/>
+              <a:buFont typeface="Wingdings 2" panose="05020102010507070707" pitchFamily="18" charset="2"/>
+              <a:buChar char=""/>
+            </a:pPr>
+            <a:r>
+              <a:rPr lang="en-US" dirty="0">
+                <a:solidFill>
+                  <a:schemeClr val="tx2"/>
+                </a:solidFill>
+              </a:rPr>
+              <a:t>Created Correlation Matrix (bottom Left) </a:t>
+            </a:r>
+          </a:p>
+          <a:p>
+            <a:pPr>
+              <a:spcBef>
+                <a:spcPct val="20000"/>
+              </a:spcBef>
+              <a:spcAft>
+                <a:spcPts val="600"/>
+              </a:spcAft>
+              <a:buClr>
+                <a:schemeClr val="accent2"/>
+              </a:buClr>
+              <a:buSzPct val="92000"/>
+              <a:buFont typeface="Wingdings 2" panose="05020102010507070707" pitchFamily="18" charset="2"/>
+              <a:buChar char=""/>
+            </a:pPr>
+            <a:r>
+              <a:rPr lang="en-US" dirty="0">
+                <a:solidFill>
+                  <a:schemeClr val="tx2"/>
+                </a:solidFill>
+              </a:rPr>
+              <a:t>Created Random Forest Model</a:t>
+            </a:r>
+          </a:p>
+          <a:p>
+            <a:pPr>
+              <a:spcBef>
+                <a:spcPct val="20000"/>
+              </a:spcBef>
+              <a:spcAft>
+                <a:spcPts val="600"/>
+              </a:spcAft>
+              <a:buClr>
+                <a:schemeClr val="accent2"/>
+              </a:buClr>
+              <a:buSzPct val="92000"/>
+              <a:buFont typeface="Wingdings 2" panose="05020102010507070707" pitchFamily="18" charset="2"/>
+              <a:buChar char=""/>
+            </a:pPr>
+            <a:r>
+              <a:rPr lang="en-US" dirty="0">
+                <a:solidFill>
+                  <a:schemeClr val="tx2"/>
+                </a:solidFill>
+              </a:rPr>
+              <a:t>Created Naïve Bayes Model (“</a:t>
+            </a:r>
+            <a:r>
+              <a:rPr lang="en-US" dirty="0" err="1">
+                <a:solidFill>
+                  <a:schemeClr val="tx2"/>
+                </a:solidFill>
+              </a:rPr>
+              <a:t>GaussianNB</a:t>
+            </a:r>
+            <a:r>
+              <a:rPr lang="en-US" dirty="0">
+                <a:solidFill>
+                  <a:schemeClr val="tx2"/>
+                </a:solidFill>
+              </a:rPr>
+              <a:t>”)</a:t>
+            </a:r>
+          </a:p>
+          <a:p>
+            <a:pPr>
+              <a:spcBef>
+                <a:spcPct val="20000"/>
+              </a:spcBef>
+              <a:spcAft>
+                <a:spcPts val="600"/>
+              </a:spcAft>
+              <a:buClr>
+                <a:schemeClr val="accent2"/>
+              </a:buClr>
+              <a:buSzPct val="92000"/>
+              <a:buFont typeface="Wingdings 2" panose="05020102010507070707" pitchFamily="18" charset="2"/>
+              <a:buChar char=""/>
+            </a:pPr>
+            <a:r>
+              <a:rPr lang="en-US" dirty="0">
+                <a:solidFill>
+                  <a:schemeClr val="tx2"/>
+                </a:solidFill>
+              </a:rPr>
+              <a:t>Repeated to explore Red and White separately, then concatenating</a:t>
+            </a:r>
+          </a:p>
+        </p:txBody>
+      </p:sp>
+      <p:sp>
+        <p:nvSpPr>
+          <p:cNvPr id="7" name="TextBox 6">
+            <a:extLst>
+              <a:ext uri="{FF2B5EF4-FFF2-40B4-BE49-F238E27FC236}">
+                <a16:creationId xmlns:a16="http://schemas.microsoft.com/office/drawing/2014/main" id="{CE47FB38-B82C-4C06-BA2A-E9AD1DBD56B0}"/>
+              </a:ext>
+            </a:extLst>
+          </p:cNvPr>
+          <p:cNvSpPr txBox="1"/>
+          <p:nvPr/>
+        </p:nvSpPr>
+        <p:spPr>
+          <a:xfrm>
+            <a:off x="4358252" y="1040004"/>
+            <a:ext cx="6956192" cy="646331"/>
+          </a:xfrm>
+          <a:prstGeom prst="rect">
+            <a:avLst/>
+          </a:prstGeom>
+          <a:noFill/>
+        </p:spPr>
+        <p:txBody>
+          <a:bodyPr wrap="square" rtlCol="0">
+            <a:spAutoFit/>
+          </a:bodyPr>
+          <a:lstStyle/>
+          <a:p>
+            <a:pPr algn="ctr"/>
+            <a:r>
+              <a:rPr lang="en-US" dirty="0">
+                <a:solidFill>
+                  <a:schemeClr val="bg1"/>
+                </a:solidFill>
+              </a:rPr>
+              <a:t>Naïve Bayes Classifier – Python “scikit-learn” Implementation</a:t>
+            </a:r>
+          </a:p>
+          <a:p>
+            <a:endParaRPr lang="en-US" dirty="0">
+              <a:solidFill>
+                <a:schemeClr val="bg1"/>
+              </a:solidFill>
+            </a:endParaRPr>
+          </a:p>
+        </p:txBody>
+      </p:sp>
+    </p:spTree>
+    <p:extLst>
+      <p:ext uri="{BB962C8B-B14F-4D97-AF65-F5344CB8AC3E}">
+        <p14:creationId xmlns:p14="http://schemas.microsoft.com/office/powerpoint/2010/main" val="3176811101"/>
+      </p:ext>
+    </p:extLst>
+  </p:cSld>
+  <p:clrMapOvr>
+    <a:masterClrMapping/>
+  </p:clrMapOvr>
+</p:sld>
+</file>
+
+<file path=ppt/slides/slide14.xml><?xml version="1.0" encoding="utf-8"?>
+<p:sld xmlns:a="http://schemas.openxmlformats.org/drawingml/2006/main" xmlns:r="http://schemas.openxmlformats.org/officeDocument/2006/relationships" xmlns:p="http://schemas.openxmlformats.org/presentationml/2006/main">
+  <p:cSld>
+    <p:bg>
+      <p:bgPr>
+        <a:solidFill>
+          <a:schemeClr val="bg1"/>
+        </a:solidFill>
+        <a:effectLst/>
+      </p:bgPr>
+    </p:bg>
+    <p:spTree>
+      <p:nvGrpSpPr>
+        <p:cNvPr id="1" name=""/>
+        <p:cNvGrpSpPr/>
+        <p:nvPr/>
+      </p:nvGrpSpPr>
+      <p:grpSpPr>
+        <a:xfrm>
+          <a:off x="0" y="0"/>
+          <a:ext cx="0" cy="0"/>
+          <a:chOff x="0" y="0"/>
+          <a:chExt cx="0" cy="0"/>
+        </a:xfrm>
+      </p:grpSpPr>
+      <p:sp>
+        <p:nvSpPr>
+          <p:cNvPr id="14" name="Rectangle 13">
+            <a:extLst>
+              <a:ext uri="{FF2B5EF4-FFF2-40B4-BE49-F238E27FC236}">
+                <a16:creationId xmlns:a16="http://schemas.microsoft.com/office/drawing/2014/main" id="{1E5E4503-CC62-4DA9-9121-0A15719984CE}"/>
+              </a:ext>
+              <a:ext uri="{C183D7F6-B498-43B3-948B-1728B52AA6E4}">
+                <adec:decorative xmlns:adec="http://schemas.microsoft.com/office/drawing/2017/decorative" val="1"/>
+              </a:ext>
+            </a:extLst>
+          </p:cNvPr>
+          <p:cNvSpPr>
+            <a:spLocks noGrp="1" noRot="1" noChangeAspect="1" noMove="1" noResize="1" noEditPoints="1" noAdjustHandles="1" noChangeArrowheads="1" noChangeShapeType="1" noTextEdit="1"/>
+          </p:cNvSpPr>
+          <p:nvPr>
+            <p:extLst>
+              <p:ext uri="{386F3935-93C4-4BCD-93E2-E3B085C9AB24}">
+                <p16:designElem xmlns:p16="http://schemas.microsoft.com/office/powerpoint/2015/main" val="1"/>
+              </p:ext>
+            </p:extLst>
+          </p:nvPr>
+        </p:nvSpPr>
+        <p:spPr>
+          <a:xfrm>
+            <a:off x="446534" y="457200"/>
+            <a:ext cx="3703320" cy="94997"/>
+          </a:xfrm>
+          <a:prstGeom prst="rect">
+            <a:avLst/>
+          </a:prstGeom>
+          <a:solidFill>
+            <a:schemeClr val="accent1"/>
+          </a:solidFill>
+          <a:ln>
+            <a:noFill/>
+          </a:ln>
+          <a:effectLst/>
+        </p:spPr>
+        <p:style>
+          <a:lnRef idx="1">
+            <a:schemeClr val="accent1"/>
+          </a:lnRef>
+          <a:fillRef idx="3">
+            <a:schemeClr val="accent1"/>
+          </a:fillRef>
+          <a:effectRef idx="2">
+            <a:schemeClr val="accent1"/>
+          </a:effectRef>
+          <a:fontRef idx="minor">
+            <a:schemeClr val="lt1"/>
+          </a:fontRef>
+        </p:style>
+      </p:sp>
+      <p:sp>
+        <p:nvSpPr>
+          <p:cNvPr id="16" name="Rectangle 15">
+            <a:extLst>
+              <a:ext uri="{FF2B5EF4-FFF2-40B4-BE49-F238E27FC236}">
+                <a16:creationId xmlns:a16="http://schemas.microsoft.com/office/drawing/2014/main" id="{D8D61A1B-3C4C-4F0E-965F-15837624CF5B}"/>
+              </a:ext>
+              <a:ext uri="{C183D7F6-B498-43B3-948B-1728B52AA6E4}">
+                <adec:decorative xmlns:adec="http://schemas.microsoft.com/office/drawing/2017/decorative" val="1"/>
+              </a:ext>
+            </a:extLst>
+          </p:cNvPr>
+          <p:cNvSpPr>
+            <a:spLocks noGrp="1" noRot="1" noChangeAspect="1" noMove="1" noResize="1" noEditPoints="1" noAdjustHandles="1" noChangeArrowheads="1" noChangeShapeType="1" noTextEdit="1"/>
+          </p:cNvSpPr>
+          <p:nvPr>
+            <p:extLst>
+              <p:ext uri="{386F3935-93C4-4BCD-93E2-E3B085C9AB24}">
+                <p16:designElem xmlns:p16="http://schemas.microsoft.com/office/powerpoint/2015/main" val="1"/>
+              </p:ext>
+            </p:extLst>
+          </p:nvPr>
+        </p:nvSpPr>
+        <p:spPr>
+          <a:xfrm>
+            <a:off x="8042147" y="453643"/>
+            <a:ext cx="3703320" cy="98554"/>
+          </a:xfrm>
+          <a:prstGeom prst="rect">
+            <a:avLst/>
+          </a:prstGeom>
+          <a:solidFill>
+            <a:schemeClr val="accent4"/>
+          </a:solidFill>
+          <a:ln>
+            <a:noFill/>
+          </a:ln>
+          <a:effectLst/>
+        </p:spPr>
+        <p:style>
+          <a:lnRef idx="1">
+            <a:schemeClr val="accent1"/>
+          </a:lnRef>
+          <a:fillRef idx="3">
+            <a:schemeClr val="accent1"/>
+          </a:fillRef>
+          <a:effectRef idx="2">
+            <a:schemeClr val="accent1"/>
+          </a:effectRef>
+          <a:fontRef idx="minor">
+            <a:schemeClr val="lt1"/>
+          </a:fontRef>
+        </p:style>
+      </p:sp>
+      <p:sp>
+        <p:nvSpPr>
+          <p:cNvPr id="18" name="Rectangle 17">
+            <a:extLst>
+              <a:ext uri="{FF2B5EF4-FFF2-40B4-BE49-F238E27FC236}">
+                <a16:creationId xmlns:a16="http://schemas.microsoft.com/office/drawing/2014/main" id="{00E56243-9701-44E8-8A92-319433305195}"/>
+              </a:ext>
+              <a:ext uri="{C183D7F6-B498-43B3-948B-1728B52AA6E4}">
+                <adec:decorative xmlns:adec="http://schemas.microsoft.com/office/drawing/2017/decorative" val="1"/>
+              </a:ext>
+            </a:extLst>
+          </p:cNvPr>
+          <p:cNvSpPr>
+            <a:spLocks noGrp="1" noRot="1" noChangeAspect="1" noMove="1" noResize="1" noEditPoints="1" noAdjustHandles="1" noChangeArrowheads="1" noChangeShapeType="1" noTextEdit="1"/>
+          </p:cNvSpPr>
+          <p:nvPr>
+            <p:extLst>
+              <p:ext uri="{386F3935-93C4-4BCD-93E2-E3B085C9AB24}">
+                <p16:designElem xmlns:p16="http://schemas.microsoft.com/office/powerpoint/2015/main" val="1"/>
+              </p:ext>
+            </p:extLst>
+          </p:nvPr>
+        </p:nvSpPr>
+        <p:spPr>
+          <a:xfrm>
+            <a:off x="4241830" y="457200"/>
+            <a:ext cx="3703320" cy="91440"/>
+          </a:xfrm>
+          <a:prstGeom prst="rect">
+            <a:avLst/>
+          </a:prstGeom>
+          <a:solidFill>
+            <a:schemeClr val="accent2"/>
+          </a:solidFill>
+          <a:ln>
+            <a:noFill/>
+          </a:ln>
+          <a:effectLst/>
+        </p:spPr>
+        <p:style>
+          <a:lnRef idx="1">
+            <a:schemeClr val="accent1"/>
+          </a:lnRef>
+          <a:fillRef idx="3">
+            <a:schemeClr val="accent1"/>
+          </a:fillRef>
+          <a:effectRef idx="2">
+            <a:schemeClr val="accent1"/>
+          </a:effectRef>
+          <a:fontRef idx="minor">
+            <a:schemeClr val="lt1"/>
+          </a:fontRef>
+        </p:style>
+      </p:sp>
+      <p:sp>
+        <p:nvSpPr>
+          <p:cNvPr id="20" name="Rectangle 19">
+            <a:extLst>
+              <a:ext uri="{FF2B5EF4-FFF2-40B4-BE49-F238E27FC236}">
+                <a16:creationId xmlns:a16="http://schemas.microsoft.com/office/drawing/2014/main" id="{5B1F1915-E076-48EB-BB4A-EE9808EB40CB}"/>
+              </a:ext>
+              <a:ext uri="{C183D7F6-B498-43B3-948B-1728B52AA6E4}">
+                <adec:decorative xmlns:adec="http://schemas.microsoft.com/office/drawing/2017/decorative" val="1"/>
+              </a:ext>
+            </a:extLst>
+          </p:cNvPr>
+          <p:cNvSpPr>
+            <a:spLocks noGrp="1" noRot="1" noChangeAspect="1" noMove="1" noResize="1" noEditPoints="1" noAdjustHandles="1" noChangeArrowheads="1" noChangeShapeType="1" noTextEdit="1"/>
+          </p:cNvSpPr>
+          <p:nvPr>
+            <p:extLst>
+              <p:ext uri="{386F3935-93C4-4BCD-93E2-E3B085C9AB24}">
+                <p16:designElem xmlns:p16="http://schemas.microsoft.com/office/powerpoint/2015/main" val="1"/>
+              </p:ext>
+            </p:extLst>
+          </p:nvPr>
+        </p:nvSpPr>
+        <p:spPr>
+          <a:xfrm>
+            <a:off x="446534" y="3085765"/>
+            <a:ext cx="11262866" cy="3304800"/>
+          </a:xfrm>
+          <a:prstGeom prst="rect">
+            <a:avLst/>
+          </a:prstGeom>
+          <a:solidFill>
+            <a:schemeClr val="accent1"/>
+          </a:solidFill>
+          <a:ln>
+            <a:noFill/>
+          </a:ln>
+          <a:effectLst/>
+        </p:spPr>
+        <p:style>
+          <a:lnRef idx="1">
+            <a:schemeClr val="accent1"/>
+          </a:lnRef>
+          <a:fillRef idx="3">
+            <a:schemeClr val="accent1"/>
+          </a:fillRef>
+          <a:effectRef idx="2">
+            <a:schemeClr val="accent1"/>
+          </a:effectRef>
+          <a:fontRef idx="minor">
+            <a:schemeClr val="lt1"/>
+          </a:fontRef>
+        </p:style>
+      </p:sp>
+      <p:sp useBgFill="1">
+        <p:nvSpPr>
+          <p:cNvPr id="22" name="Rectangle 21">
+            <a:extLst>
+              <a:ext uri="{FF2B5EF4-FFF2-40B4-BE49-F238E27FC236}">
+                <a16:creationId xmlns:a16="http://schemas.microsoft.com/office/drawing/2014/main" id="{4CFB7F65-9106-4CAB-B5F1-B6B1476E70A0}"/>
+              </a:ext>
+              <a:ext uri="{C183D7F6-B498-43B3-948B-1728B52AA6E4}">
+                <adec:decorative xmlns:adec="http://schemas.microsoft.com/office/drawing/2017/decorative" val="1"/>
+              </a:ext>
+            </a:extLst>
+          </p:cNvPr>
+          <p:cNvSpPr>
+            <a:spLocks noGrp="1" noRot="1" noChangeAspect="1" noMove="1" noResize="1" noEditPoints="1" noAdjustHandles="1" noChangeArrowheads="1" noChangeShapeType="1" noTextEdit="1"/>
+          </p:cNvSpPr>
+          <p:nvPr>
+            <p:extLst>
+              <p:ext uri="{386F3935-93C4-4BCD-93E2-E3B085C9AB24}">
+                <p16:designElem xmlns:p16="http://schemas.microsoft.com/office/powerpoint/2015/main" val="1"/>
+              </p:ext>
+            </p:extLst>
+          </p:nvPr>
+        </p:nvSpPr>
+        <p:spPr>
+          <a:xfrm>
+            <a:off x="0" y="0"/>
+            <a:ext cx="12192000" cy="6858000"/>
+          </a:xfrm>
+          <a:prstGeom prst="rect">
+            <a:avLst/>
+          </a:prstGeom>
+          <a:ln>
+            <a:noFill/>
+          </a:ln>
+        </p:spPr>
+        <p:style>
+          <a:lnRef idx="2">
+            <a:schemeClr val="accent1">
+              <a:shade val="50000"/>
+            </a:schemeClr>
+          </a:lnRef>
+          <a:fillRef idx="1">
+            <a:schemeClr val="accent1"/>
+          </a:fillRef>
+          <a:effectRef idx="0">
+            <a:schemeClr val="accent1"/>
+          </a:effectRef>
+          <a:fontRef idx="minor">
+            <a:schemeClr val="lt1"/>
+          </a:fontRef>
+        </p:style>
+        <p:txBody>
+          <a:bodyPr rtlCol="0" anchor="ctr"/>
+          <a:lstStyle/>
+          <a:p>
+            <a:pPr algn="ctr"/>
+            <a:endParaRPr lang="en-US"/>
+          </a:p>
+        </p:txBody>
+      </p:sp>
+      <p:sp>
+        <p:nvSpPr>
+          <p:cNvPr id="24" name="Rectangle 23">
+            <a:extLst>
+              <a:ext uri="{FF2B5EF4-FFF2-40B4-BE49-F238E27FC236}">
+                <a16:creationId xmlns:a16="http://schemas.microsoft.com/office/drawing/2014/main" id="{E0996FEB-A7FD-41B5-AC7B-E2ED8B7623A2}"/>
+              </a:ext>
+              <a:ext uri="{C183D7F6-B498-43B3-948B-1728B52AA6E4}">
+                <adec:decorative xmlns:adec="http://schemas.microsoft.com/office/drawing/2017/decorative" val="1"/>
+              </a:ext>
+            </a:extLst>
+          </p:cNvPr>
+          <p:cNvSpPr>
+            <a:spLocks noGrp="1" noRot="1" noChangeAspect="1" noMove="1" noResize="1" noEditPoints="1" noAdjustHandles="1" noChangeArrowheads="1" noChangeShapeType="1" noTextEdit="1"/>
+          </p:cNvSpPr>
+          <p:nvPr>
+            <p:extLst>
+              <p:ext uri="{386F3935-93C4-4BCD-93E2-E3B085C9AB24}">
+                <p16:designElem xmlns:p16="http://schemas.microsoft.com/office/powerpoint/2015/main" val="1"/>
+              </p:ext>
+            </p:extLst>
+          </p:nvPr>
+        </p:nvSpPr>
+        <p:spPr>
+          <a:xfrm>
+            <a:off x="446534" y="457200"/>
+            <a:ext cx="3703320" cy="94997"/>
+          </a:xfrm>
+          <a:prstGeom prst="rect">
+            <a:avLst/>
+          </a:prstGeom>
+          <a:solidFill>
+            <a:schemeClr val="accent1"/>
+          </a:solidFill>
+          <a:ln>
+            <a:noFill/>
+          </a:ln>
+          <a:effectLst/>
+        </p:spPr>
+        <p:style>
+          <a:lnRef idx="1">
+            <a:schemeClr val="accent1"/>
+          </a:lnRef>
+          <a:fillRef idx="3">
+            <a:schemeClr val="accent1"/>
+          </a:fillRef>
+          <a:effectRef idx="2">
+            <a:schemeClr val="accent1"/>
+          </a:effectRef>
+          <a:fontRef idx="minor">
+            <a:schemeClr val="lt1"/>
+          </a:fontRef>
+        </p:style>
+      </p:sp>
+      <p:sp>
+        <p:nvSpPr>
+          <p:cNvPr id="38" name="Rectangle 25">
+            <a:extLst>
+              <a:ext uri="{FF2B5EF4-FFF2-40B4-BE49-F238E27FC236}">
+                <a16:creationId xmlns:a16="http://schemas.microsoft.com/office/drawing/2014/main" id="{2F3AC5DB-7693-457F-ACCC-7E0B50B989B1}"/>
+              </a:ext>
+              <a:ext uri="{C183D7F6-B498-43B3-948B-1728B52AA6E4}">
+                <adec:decorative xmlns:adec="http://schemas.microsoft.com/office/drawing/2017/decorative" val="1"/>
+              </a:ext>
+            </a:extLst>
+          </p:cNvPr>
+          <p:cNvSpPr>
+            <a:spLocks noGrp="1" noRot="1" noChangeAspect="1" noMove="1" noResize="1" noEditPoints="1" noAdjustHandles="1" noChangeArrowheads="1" noChangeShapeType="1" noTextEdit="1"/>
+          </p:cNvSpPr>
+          <p:nvPr>
+            <p:extLst>
+              <p:ext uri="{386F3935-93C4-4BCD-93E2-E3B085C9AB24}">
+                <p16:designElem xmlns:p16="http://schemas.microsoft.com/office/powerpoint/2015/main" val="1"/>
+              </p:ext>
+            </p:extLst>
+          </p:nvPr>
+        </p:nvSpPr>
+        <p:spPr>
+          <a:xfrm>
+            <a:off x="4241830" y="457200"/>
+            <a:ext cx="3703320" cy="91440"/>
+          </a:xfrm>
+          <a:prstGeom prst="rect">
+            <a:avLst/>
+          </a:prstGeom>
+          <a:solidFill>
+            <a:schemeClr val="accent2"/>
+          </a:solidFill>
+          <a:ln>
+            <a:noFill/>
+          </a:ln>
+          <a:effectLst/>
+        </p:spPr>
+        <p:style>
+          <a:lnRef idx="1">
+            <a:schemeClr val="accent1"/>
+          </a:lnRef>
+          <a:fillRef idx="3">
+            <a:schemeClr val="accent1"/>
+          </a:fillRef>
+          <a:effectRef idx="2">
+            <a:schemeClr val="accent1"/>
+          </a:effectRef>
+          <a:fontRef idx="minor">
+            <a:schemeClr val="lt1"/>
+          </a:fontRef>
+        </p:style>
+      </p:sp>
+      <p:sp>
+        <p:nvSpPr>
+          <p:cNvPr id="39" name="Rectangle 27">
+            <a:extLst>
+              <a:ext uri="{FF2B5EF4-FFF2-40B4-BE49-F238E27FC236}">
+                <a16:creationId xmlns:a16="http://schemas.microsoft.com/office/drawing/2014/main" id="{7F9DE51B-4C99-46DA-BAA8-AFBACAA90C43}"/>
+              </a:ext>
+              <a:ext uri="{C183D7F6-B498-43B3-948B-1728B52AA6E4}">
+                <adec:decorative xmlns:adec="http://schemas.microsoft.com/office/drawing/2017/decorative" val="1"/>
+              </a:ext>
+            </a:extLst>
+          </p:cNvPr>
+          <p:cNvSpPr>
+            <a:spLocks noGrp="1" noRot="1" noChangeAspect="1" noMove="1" noResize="1" noEditPoints="1" noAdjustHandles="1" noChangeArrowheads="1" noChangeShapeType="1" noTextEdit="1"/>
+          </p:cNvSpPr>
+          <p:nvPr>
+            <p:extLst>
+              <p:ext uri="{386F3935-93C4-4BCD-93E2-E3B085C9AB24}">
+                <p16:designElem xmlns:p16="http://schemas.microsoft.com/office/powerpoint/2015/main" val="1"/>
+              </p:ext>
+            </p:extLst>
+          </p:nvPr>
+        </p:nvSpPr>
+        <p:spPr>
+          <a:xfrm>
+            <a:off x="8042147" y="453643"/>
+            <a:ext cx="3703320" cy="98554"/>
+          </a:xfrm>
+          <a:prstGeom prst="rect">
+            <a:avLst/>
+          </a:prstGeom>
+          <a:solidFill>
+            <a:schemeClr val="accent4"/>
+          </a:solidFill>
+          <a:ln>
+            <a:noFill/>
+          </a:ln>
+          <a:effectLst/>
+        </p:spPr>
+        <p:style>
+          <a:lnRef idx="1">
+            <a:schemeClr val="accent1"/>
+          </a:lnRef>
+          <a:fillRef idx="3">
+            <a:schemeClr val="accent1"/>
+          </a:fillRef>
+          <a:effectRef idx="2">
+            <a:schemeClr val="accent1"/>
+          </a:effectRef>
+          <a:fontRef idx="minor">
+            <a:schemeClr val="lt1"/>
+          </a:fontRef>
+        </p:style>
+      </p:sp>
+      <p:sp>
+        <p:nvSpPr>
+          <p:cNvPr id="40" name="Rectangle 29">
+            <a:extLst>
+              <a:ext uri="{FF2B5EF4-FFF2-40B4-BE49-F238E27FC236}">
+                <a16:creationId xmlns:a16="http://schemas.microsoft.com/office/drawing/2014/main" id="{1C96A87B-A6AF-49F9-A35C-DBCD32934F73}"/>
+              </a:ext>
+              <a:ext uri="{C183D7F6-B498-43B3-948B-1728B52AA6E4}">
+                <adec:decorative xmlns:adec="http://schemas.microsoft.com/office/drawing/2017/decorative" val="1"/>
+              </a:ext>
+            </a:extLst>
+          </p:cNvPr>
+          <p:cNvSpPr>
+            <a:spLocks noGrp="1" noRot="1" noChangeAspect="1" noMove="1" noResize="1" noEditPoints="1" noAdjustHandles="1" noChangeArrowheads="1" noChangeShapeType="1" noTextEdit="1"/>
+          </p:cNvSpPr>
+          <p:nvPr>
+            <p:extLst>
+              <p:ext uri="{386F3935-93C4-4BCD-93E2-E3B085C9AB24}">
+                <p16:designElem xmlns:p16="http://schemas.microsoft.com/office/powerpoint/2015/main" val="1"/>
+              </p:ext>
+            </p:extLst>
+          </p:nvPr>
+        </p:nvSpPr>
+        <p:spPr>
+          <a:xfrm>
+            <a:off x="446533" y="641075"/>
+            <a:ext cx="11296733" cy="2191098"/>
+          </a:xfrm>
+          <a:prstGeom prst="rect">
+            <a:avLst/>
+          </a:prstGeom>
+          <a:solidFill>
+            <a:schemeClr val="accent1"/>
+          </a:solidFill>
+          <a:ln>
+            <a:noFill/>
+          </a:ln>
+          <a:effectLst/>
+        </p:spPr>
+        <p:style>
+          <a:lnRef idx="1">
+            <a:schemeClr val="accent1"/>
+          </a:lnRef>
+          <a:fillRef idx="3">
+            <a:schemeClr val="accent1"/>
+          </a:fillRef>
+          <a:effectRef idx="2">
+            <a:schemeClr val="accent1"/>
+          </a:effectRef>
+          <a:fontRef idx="minor">
+            <a:schemeClr val="lt1"/>
+          </a:fontRef>
+        </p:style>
+      </p:sp>
+      <p:sp>
+        <p:nvSpPr>
+          <p:cNvPr id="3" name="TextBox 2">
+            <a:extLst>
+              <a:ext uri="{FF2B5EF4-FFF2-40B4-BE49-F238E27FC236}">
+                <a16:creationId xmlns:a16="http://schemas.microsoft.com/office/drawing/2014/main" id="{E72E9225-856A-42B0-8E9D-F1A258BDA6D8}"/>
+              </a:ext>
+            </a:extLst>
+          </p:cNvPr>
+          <p:cNvSpPr txBox="1"/>
+          <p:nvPr/>
+        </p:nvSpPr>
+        <p:spPr>
+          <a:xfrm>
+            <a:off x="581191" y="776445"/>
+            <a:ext cx="10993549" cy="1140874"/>
+          </a:xfrm>
+          <a:prstGeom prst="rect">
+            <a:avLst/>
+          </a:prstGeom>
+        </p:spPr>
+        <p:txBody>
+          <a:bodyPr vert="horz" lIns="91440" tIns="45720" rIns="91440" bIns="45720" rtlCol="0" anchor="b">
+            <a:normAutofit/>
+          </a:bodyPr>
+          <a:lstStyle/>
+          <a:p>
+            <a:pPr>
+              <a:lnSpc>
+                <a:spcPct val="90000"/>
+              </a:lnSpc>
+              <a:spcBef>
+                <a:spcPct val="0"/>
+              </a:spcBef>
+              <a:spcAft>
+                <a:spcPts val="600"/>
+              </a:spcAft>
+            </a:pPr>
+            <a:r>
+              <a:rPr lang="en-US" sz="3600" cap="all">
+                <a:solidFill>
+                  <a:srgbClr val="FFFFFF"/>
+                </a:solidFill>
+                <a:latin typeface="+mj-lt"/>
+                <a:ea typeface="+mj-ea"/>
+                <a:cs typeface="+mj-cs"/>
+              </a:rPr>
+              <a:t>Naïve Bayes Classifier – Python “scikit-learn” Implementation</a:t>
+            </a:r>
+          </a:p>
+        </p:txBody>
+      </p:sp>
+      <p:pic>
+        <p:nvPicPr>
+          <p:cNvPr id="5" name="Picture 4">
+            <a:extLst>
+              <a:ext uri="{FF2B5EF4-FFF2-40B4-BE49-F238E27FC236}">
+                <a16:creationId xmlns:a16="http://schemas.microsoft.com/office/drawing/2014/main" id="{97062FEF-318E-47A6-9EB5-A04039D68326}"/>
+              </a:ext>
+            </a:extLst>
+          </p:cNvPr>
+          <p:cNvPicPr>
+            <a:picLocks noChangeAspect="1"/>
+          </p:cNvPicPr>
+          <p:nvPr/>
+        </p:nvPicPr>
+        <p:blipFill>
+          <a:blip r:embed="rId2"/>
+          <a:stretch>
+            <a:fillRect/>
+          </a:stretch>
+        </p:blipFill>
+        <p:spPr>
+          <a:xfrm>
+            <a:off x="482599" y="3085765"/>
+            <a:ext cx="6846455" cy="770225"/>
+          </a:xfrm>
+          <a:prstGeom prst="rect">
+            <a:avLst/>
+          </a:prstGeom>
+        </p:spPr>
+      </p:pic>
+      <p:pic>
+        <p:nvPicPr>
+          <p:cNvPr id="9" name="Picture 8">
+            <a:extLst>
+              <a:ext uri="{FF2B5EF4-FFF2-40B4-BE49-F238E27FC236}">
+                <a16:creationId xmlns:a16="http://schemas.microsoft.com/office/drawing/2014/main" id="{BA451277-7694-45D6-8E2F-504FC9581D59}"/>
+              </a:ext>
+            </a:extLst>
+          </p:cNvPr>
+          <p:cNvPicPr>
+            <a:picLocks noChangeAspect="1"/>
+          </p:cNvPicPr>
+          <p:nvPr/>
+        </p:nvPicPr>
+        <p:blipFill>
+          <a:blip r:embed="rId3"/>
+          <a:stretch>
+            <a:fillRect/>
+          </a:stretch>
+        </p:blipFill>
+        <p:spPr>
+          <a:xfrm>
+            <a:off x="596013" y="4184563"/>
+            <a:ext cx="5936180" cy="2107343"/>
+          </a:xfrm>
+          <a:prstGeom prst="rect">
+            <a:avLst/>
+          </a:prstGeom>
+        </p:spPr>
+      </p:pic>
+      <p:pic>
+        <p:nvPicPr>
+          <p:cNvPr id="7" name="Picture 6">
+            <a:extLst>
+              <a:ext uri="{FF2B5EF4-FFF2-40B4-BE49-F238E27FC236}">
+                <a16:creationId xmlns:a16="http://schemas.microsoft.com/office/drawing/2014/main" id="{24AD1D5E-CD8D-4A09-8D4B-435B817A7984}"/>
+              </a:ext>
+            </a:extLst>
+          </p:cNvPr>
+          <p:cNvPicPr>
+            <a:picLocks noChangeAspect="1"/>
+          </p:cNvPicPr>
+          <p:nvPr/>
+        </p:nvPicPr>
+        <p:blipFill>
+          <a:blip r:embed="rId4"/>
+          <a:stretch>
+            <a:fillRect/>
+          </a:stretch>
+        </p:blipFill>
+        <p:spPr>
+          <a:xfrm>
+            <a:off x="6566665" y="4085906"/>
+            <a:ext cx="5621123" cy="2304659"/>
+          </a:xfrm>
+          <a:prstGeom prst="rect">
+            <a:avLst/>
+          </a:prstGeom>
+        </p:spPr>
+      </p:pic>
+      <p:sp>
+        <p:nvSpPr>
+          <p:cNvPr id="10" name="Oval 9">
+            <a:extLst>
+              <a:ext uri="{FF2B5EF4-FFF2-40B4-BE49-F238E27FC236}">
+                <a16:creationId xmlns:a16="http://schemas.microsoft.com/office/drawing/2014/main" id="{1AB3B1B9-CC42-42F3-9E3D-37393297234F}"/>
+              </a:ext>
+            </a:extLst>
+          </p:cNvPr>
+          <p:cNvSpPr/>
+          <p:nvPr/>
+        </p:nvSpPr>
+        <p:spPr>
+          <a:xfrm>
+            <a:off x="8641372" y="5896493"/>
+            <a:ext cx="408035" cy="218557"/>
+          </a:xfrm>
+          <a:prstGeom prst="ellipse">
+            <a:avLst/>
+          </a:prstGeom>
+          <a:noFill/>
+        </p:spPr>
+        <p:style>
+          <a:lnRef idx="2">
+            <a:schemeClr val="accent6"/>
+          </a:lnRef>
+          <a:fillRef idx="1">
+            <a:schemeClr val="lt1"/>
+          </a:fillRef>
+          <a:effectRef idx="0">
+            <a:schemeClr val="accent6"/>
+          </a:effectRef>
+          <a:fontRef idx="minor">
+            <a:schemeClr val="dk1"/>
+          </a:fontRef>
+        </p:style>
+        <p:txBody>
+          <a:bodyPr rtlCol="0" anchor="ctr"/>
+          <a:lstStyle/>
+          <a:p>
+            <a:pPr algn="ctr"/>
+            <a:endParaRPr lang="en-US"/>
+          </a:p>
+        </p:txBody>
+      </p:sp>
+      <p:sp>
+        <p:nvSpPr>
+          <p:cNvPr id="41" name="Oval 40">
+            <a:extLst>
+              <a:ext uri="{FF2B5EF4-FFF2-40B4-BE49-F238E27FC236}">
+                <a16:creationId xmlns:a16="http://schemas.microsoft.com/office/drawing/2014/main" id="{577213B8-350C-4358-AA5A-8D9D51EB5CE4}"/>
+              </a:ext>
+            </a:extLst>
+          </p:cNvPr>
+          <p:cNvSpPr/>
+          <p:nvPr/>
+        </p:nvSpPr>
+        <p:spPr>
+          <a:xfrm>
+            <a:off x="3708400" y="5638800"/>
+            <a:ext cx="685830" cy="355600"/>
+          </a:xfrm>
+          <a:prstGeom prst="ellipse">
+            <a:avLst/>
+          </a:prstGeom>
+          <a:noFill/>
+        </p:spPr>
+        <p:style>
+          <a:lnRef idx="2">
+            <a:schemeClr val="accent6"/>
+          </a:lnRef>
+          <a:fillRef idx="1">
+            <a:schemeClr val="lt1"/>
+          </a:fillRef>
+          <a:effectRef idx="0">
+            <a:schemeClr val="accent6"/>
+          </a:effectRef>
+          <a:fontRef idx="minor">
+            <a:schemeClr val="dk1"/>
+          </a:fontRef>
+        </p:style>
+        <p:txBody>
+          <a:bodyPr rtlCol="0" anchor="ctr"/>
+          <a:lstStyle/>
+          <a:p>
+            <a:pPr algn="ctr"/>
+            <a:endParaRPr lang="en-US"/>
+          </a:p>
+        </p:txBody>
+      </p:sp>
+    </p:spTree>
+    <p:extLst>
+      <p:ext uri="{BB962C8B-B14F-4D97-AF65-F5344CB8AC3E}">
+        <p14:creationId xmlns:p14="http://schemas.microsoft.com/office/powerpoint/2010/main" val="1874969345"/>
+      </p:ext>
+    </p:extLst>
+  </p:cSld>
+  <p:clrMapOvr>
+    <a:masterClrMapping/>
+  </p:clrMapOvr>
+</p:sld>
+</file>
+
+<file path=ppt/slides/slide15.xml><?xml version="1.0" encoding="utf-8"?>
+<p:sld xmlns:a="http://schemas.openxmlformats.org/drawingml/2006/main" xmlns:r="http://schemas.openxmlformats.org/officeDocument/2006/relationships" xmlns:p="http://schemas.openxmlformats.org/presentationml/2006/main">
+  <p:cSld>
+    <p:bg>
+      <p:bgPr>
+        <a:solidFill>
+          <a:schemeClr val="bg2"/>
+        </a:solidFill>
+        <a:effectLst/>
+      </p:bgPr>
+    </p:bg>
+    <p:spTree>
+      <p:nvGrpSpPr>
+        <p:cNvPr id="1" name=""/>
+        <p:cNvGrpSpPr/>
+        <p:nvPr/>
+      </p:nvGrpSpPr>
+      <p:grpSpPr>
+        <a:xfrm>
+          <a:off x="0" y="0"/>
+          <a:ext cx="0" cy="0"/>
+          <a:chOff x="0" y="0"/>
+          <a:chExt cx="0" cy="0"/>
+        </a:xfrm>
+      </p:grpSpPr>
+      <p:sp useBgFill="1">
+        <p:nvSpPr>
+          <p:cNvPr id="10" name="Rectangle 9">
+            <a:extLst>
+              <a:ext uri="{FF2B5EF4-FFF2-40B4-BE49-F238E27FC236}">
+                <a16:creationId xmlns:a16="http://schemas.microsoft.com/office/drawing/2014/main" id="{445D07A0-3250-4D1F-9117-E0571AB3B334}"/>
+              </a:ext>
+              <a:ext uri="{C183D7F6-B498-43B3-948B-1728B52AA6E4}">
+                <adec:decorative xmlns:adec="http://schemas.microsoft.com/office/drawing/2017/decorative" val="1"/>
+              </a:ext>
+            </a:extLst>
+          </p:cNvPr>
+          <p:cNvSpPr>
+            <a:spLocks noGrp="1" noRot="1" noChangeAspect="1" noMove="1" noResize="1" noEditPoints="1" noAdjustHandles="1" noChangeArrowheads="1" noChangeShapeType="1" noTextEdit="1"/>
+          </p:cNvSpPr>
+          <p:nvPr>
+            <p:extLst>
+              <p:ext uri="{386F3935-93C4-4BCD-93E2-E3B085C9AB24}">
+                <p16:designElem xmlns:p16="http://schemas.microsoft.com/office/powerpoint/2015/main" val="1"/>
+              </p:ext>
+            </p:extLst>
+          </p:nvPr>
+        </p:nvSpPr>
+        <p:spPr>
+          <a:xfrm>
+            <a:off x="0" y="0"/>
+            <a:ext cx="12192000" cy="6858000"/>
+          </a:xfrm>
+          <a:prstGeom prst="rect">
+            <a:avLst/>
+          </a:prstGeom>
+          <a:ln>
+            <a:noFill/>
+          </a:ln>
+        </p:spPr>
+        <p:style>
+          <a:lnRef idx="2">
+            <a:schemeClr val="accent1">
+              <a:shade val="50000"/>
+            </a:schemeClr>
+          </a:lnRef>
+          <a:fillRef idx="1">
+            <a:schemeClr val="accent1"/>
+          </a:fillRef>
+          <a:effectRef idx="0">
+            <a:schemeClr val="accent1"/>
+          </a:effectRef>
+          <a:fontRef idx="minor">
+            <a:schemeClr val="lt1"/>
+          </a:fontRef>
+        </p:style>
+        <p:txBody>
+          <a:bodyPr rtlCol="0" anchor="ctr"/>
+          <a:lstStyle/>
+          <a:p>
+            <a:pPr algn="ctr"/>
+            <a:endParaRPr lang="en-US"/>
+          </a:p>
+        </p:txBody>
+      </p:sp>
+      <p:pic>
+        <p:nvPicPr>
+          <p:cNvPr id="3" name="Picture 2" descr="Text, application, email&#10;&#10;Description automatically generated">
+            <a:extLst>
+              <a:ext uri="{FF2B5EF4-FFF2-40B4-BE49-F238E27FC236}">
+                <a16:creationId xmlns:a16="http://schemas.microsoft.com/office/drawing/2014/main" id="{E994BA96-3250-4958-89E7-3DC3272BD2CB}"/>
+              </a:ext>
+            </a:extLst>
+          </p:cNvPr>
+          <p:cNvPicPr>
+            <a:picLocks noChangeAspect="1"/>
+          </p:cNvPicPr>
+          <p:nvPr/>
+        </p:nvPicPr>
+        <p:blipFill rotWithShape="1">
+          <a:blip r:embed="rId3"/>
+          <a:srcRect l="2859" r="46267" b="-1"/>
+          <a:stretch/>
+        </p:blipFill>
+        <p:spPr>
+          <a:xfrm>
+            <a:off x="643469" y="643467"/>
+            <a:ext cx="5200309" cy="5571066"/>
+          </a:xfrm>
+          <a:prstGeom prst="rect">
+            <a:avLst/>
+          </a:prstGeom>
+        </p:spPr>
+      </p:pic>
+      <p:sp>
+        <p:nvSpPr>
+          <p:cNvPr id="12" name="Rectangle 11">
+            <a:extLst>
+              <a:ext uri="{FF2B5EF4-FFF2-40B4-BE49-F238E27FC236}">
+                <a16:creationId xmlns:a16="http://schemas.microsoft.com/office/drawing/2014/main" id="{5DFA6C29-F1CC-4E52-9333-E5453ED1C187}"/>
+              </a:ext>
+              <a:ext uri="{C183D7F6-B498-43B3-948B-1728B52AA6E4}">
+                <adec:decorative xmlns:adec="http://schemas.microsoft.com/office/drawing/2017/decorative" val="1"/>
+              </a:ext>
+            </a:extLst>
+          </p:cNvPr>
+          <p:cNvSpPr>
+            <a:spLocks noGrp="1" noRot="1" noChangeAspect="1" noMove="1" noResize="1" noEditPoints="1" noAdjustHandles="1" noChangeArrowheads="1" noChangeShapeType="1" noTextEdit="1"/>
+          </p:cNvSpPr>
+          <p:nvPr>
+            <p:extLst>
+              <p:ext uri="{386F3935-93C4-4BCD-93E2-E3B085C9AB24}">
+                <p16:designElem xmlns:p16="http://schemas.microsoft.com/office/powerpoint/2015/main" val="1"/>
+              </p:ext>
+            </p:extLst>
+          </p:nvPr>
+        </p:nvSpPr>
+        <p:spPr>
+          <a:xfrm>
+            <a:off x="477012" y="480060"/>
+            <a:ext cx="5537156" cy="5897880"/>
+          </a:xfrm>
+          <a:prstGeom prst="rect">
+            <a:avLst/>
+          </a:prstGeom>
+          <a:noFill/>
+          <a:ln cap="sq">
+            <a:solidFill>
+              <a:schemeClr val="tx1"/>
+            </a:solidFill>
+            <a:miter lim="800000"/>
+          </a:ln>
+        </p:spPr>
+        <p:style>
+          <a:lnRef idx="2">
+            <a:schemeClr val="accent1">
+              <a:shade val="50000"/>
+            </a:schemeClr>
+          </a:lnRef>
+          <a:fillRef idx="1">
+            <a:schemeClr val="accent1"/>
+          </a:fillRef>
+          <a:effectRef idx="0">
+            <a:schemeClr val="accent1"/>
+          </a:effectRef>
+          <a:fontRef idx="minor">
+            <a:schemeClr val="lt1"/>
+          </a:fontRef>
+        </p:style>
+        <p:txBody>
+          <a:bodyPr rtlCol="0" anchor="ctr"/>
+          <a:lstStyle/>
+          <a:p>
+            <a:pPr algn="ctr"/>
+            <a:endParaRPr lang="en-US"/>
+          </a:p>
+        </p:txBody>
+      </p:sp>
+      <p:pic>
+        <p:nvPicPr>
+          <p:cNvPr id="5" name="Picture 4">
+            <a:extLst>
+              <a:ext uri="{FF2B5EF4-FFF2-40B4-BE49-F238E27FC236}">
+                <a16:creationId xmlns:a16="http://schemas.microsoft.com/office/drawing/2014/main" id="{646C1AC8-C074-45FA-8F99-29991939236A}"/>
+              </a:ext>
+            </a:extLst>
+          </p:cNvPr>
+          <p:cNvPicPr>
+            <a:picLocks noChangeAspect="1"/>
+          </p:cNvPicPr>
+          <p:nvPr/>
+        </p:nvPicPr>
+        <p:blipFill rotWithShape="1">
+          <a:blip r:embed="rId4"/>
+          <a:srcRect r="29972" b="-1"/>
+          <a:stretch/>
+        </p:blipFill>
+        <p:spPr>
+          <a:xfrm>
+            <a:off x="6346822" y="643467"/>
+            <a:ext cx="5201708" cy="5571066"/>
+          </a:xfrm>
+          <a:prstGeom prst="rect">
+            <a:avLst/>
+          </a:prstGeom>
+        </p:spPr>
+      </p:pic>
+      <p:sp>
+        <p:nvSpPr>
+          <p:cNvPr id="14" name="Rectangle 13">
+            <a:extLst>
+              <a:ext uri="{FF2B5EF4-FFF2-40B4-BE49-F238E27FC236}">
+                <a16:creationId xmlns:a16="http://schemas.microsoft.com/office/drawing/2014/main" id="{DB219EE3-E1F6-411D-B1DB-E18A3BCEE4CD}"/>
+              </a:ext>
+              <a:ext uri="{C183D7F6-B498-43B3-948B-1728B52AA6E4}">
+                <adec:decorative xmlns:adec="http://schemas.microsoft.com/office/drawing/2017/decorative" val="1"/>
+              </a:ext>
+            </a:extLst>
+          </p:cNvPr>
+          <p:cNvSpPr>
+            <a:spLocks noGrp="1" noRot="1" noChangeAspect="1" noMove="1" noResize="1" noEditPoints="1" noAdjustHandles="1" noChangeArrowheads="1" noChangeShapeType="1" noTextEdit="1"/>
+          </p:cNvSpPr>
+          <p:nvPr>
+            <p:extLst>
+              <p:ext uri="{386F3935-93C4-4BCD-93E2-E3B085C9AB24}">
+                <p16:designElem xmlns:p16="http://schemas.microsoft.com/office/powerpoint/2015/main" val="1"/>
+              </p:ext>
+            </p:extLst>
+          </p:nvPr>
+        </p:nvSpPr>
+        <p:spPr>
+          <a:xfrm>
+            <a:off x="6175035" y="480060"/>
+            <a:ext cx="5531569" cy="5897880"/>
+          </a:xfrm>
+          <a:prstGeom prst="rect">
+            <a:avLst/>
+          </a:prstGeom>
+          <a:noFill/>
+          <a:ln cap="sq">
+            <a:solidFill>
+              <a:schemeClr val="tx1"/>
+            </a:solidFill>
+            <a:miter lim="800000"/>
+          </a:ln>
+        </p:spPr>
+        <p:style>
+          <a:lnRef idx="2">
+            <a:schemeClr val="accent1">
+              <a:shade val="50000"/>
+            </a:schemeClr>
+          </a:lnRef>
+          <a:fillRef idx="1">
+            <a:schemeClr val="accent1"/>
+          </a:fillRef>
+          <a:effectRef idx="0">
+            <a:schemeClr val="accent1"/>
+          </a:effectRef>
+          <a:fontRef idx="minor">
+            <a:schemeClr val="lt1"/>
+          </a:fontRef>
+        </p:style>
+        <p:txBody>
+          <a:bodyPr rtlCol="0" anchor="ctr"/>
+          <a:lstStyle/>
+          <a:p>
+            <a:pPr algn="ctr"/>
+            <a:endParaRPr lang="en-US"/>
+          </a:p>
+        </p:txBody>
+      </p:sp>
+      <p:sp>
+        <p:nvSpPr>
+          <p:cNvPr id="7" name="TextBox 6">
+            <a:extLst>
+              <a:ext uri="{FF2B5EF4-FFF2-40B4-BE49-F238E27FC236}">
+                <a16:creationId xmlns:a16="http://schemas.microsoft.com/office/drawing/2014/main" id="{D4A8C1F8-9181-4441-BA3D-2B4E8D6B34FF}"/>
+              </a:ext>
+            </a:extLst>
+          </p:cNvPr>
+          <p:cNvSpPr txBox="1"/>
+          <p:nvPr/>
+        </p:nvSpPr>
+        <p:spPr>
+          <a:xfrm>
+            <a:off x="8119867" y="137353"/>
+            <a:ext cx="1655618" cy="369332"/>
+          </a:xfrm>
+          <a:prstGeom prst="rect">
+            <a:avLst/>
+          </a:prstGeom>
+          <a:noFill/>
+        </p:spPr>
+        <p:txBody>
+          <a:bodyPr wrap="square" rtlCol="0">
+            <a:spAutoFit/>
+          </a:bodyPr>
+          <a:lstStyle/>
+          <a:p>
+            <a:pPr algn="ctr"/>
+            <a:r>
+              <a:rPr lang="en-US" dirty="0"/>
+              <a:t>White</a:t>
+            </a:r>
+          </a:p>
+        </p:txBody>
+      </p:sp>
+      <p:sp>
+        <p:nvSpPr>
+          <p:cNvPr id="13" name="TextBox 12">
+            <a:extLst>
+              <a:ext uri="{FF2B5EF4-FFF2-40B4-BE49-F238E27FC236}">
+                <a16:creationId xmlns:a16="http://schemas.microsoft.com/office/drawing/2014/main" id="{0CAF848E-3FC2-41F3-B948-F238861C8F56}"/>
+              </a:ext>
+            </a:extLst>
+          </p:cNvPr>
+          <p:cNvSpPr txBox="1"/>
+          <p:nvPr/>
+        </p:nvSpPr>
+        <p:spPr>
+          <a:xfrm>
+            <a:off x="2416516" y="110728"/>
+            <a:ext cx="1655618" cy="369332"/>
+          </a:xfrm>
+          <a:prstGeom prst="rect">
+            <a:avLst/>
+          </a:prstGeom>
+          <a:noFill/>
+        </p:spPr>
+        <p:txBody>
+          <a:bodyPr wrap="square" rtlCol="0">
+            <a:spAutoFit/>
+          </a:bodyPr>
+          <a:lstStyle/>
+          <a:p>
+            <a:pPr algn="ctr"/>
+            <a:r>
+              <a:rPr lang="en-US" dirty="0"/>
+              <a:t>Red</a:t>
+            </a:r>
+          </a:p>
+        </p:txBody>
+      </p:sp>
+      <p:sp>
+        <p:nvSpPr>
+          <p:cNvPr id="15" name="Oval 14">
+            <a:extLst>
+              <a:ext uri="{FF2B5EF4-FFF2-40B4-BE49-F238E27FC236}">
+                <a16:creationId xmlns:a16="http://schemas.microsoft.com/office/drawing/2014/main" id="{C1CD84B2-9C2C-456E-AA21-FEF67C5A6BB5}"/>
+              </a:ext>
+            </a:extLst>
+          </p:cNvPr>
+          <p:cNvSpPr/>
+          <p:nvPr/>
+        </p:nvSpPr>
+        <p:spPr>
+          <a:xfrm>
+            <a:off x="3839029" y="2569028"/>
+            <a:ext cx="685830" cy="355600"/>
+          </a:xfrm>
+          <a:prstGeom prst="ellipse">
+            <a:avLst/>
+          </a:prstGeom>
+          <a:noFill/>
+        </p:spPr>
+        <p:style>
+          <a:lnRef idx="2">
+            <a:schemeClr val="accent6"/>
+          </a:lnRef>
+          <a:fillRef idx="1">
+            <a:schemeClr val="lt1"/>
+          </a:fillRef>
+          <a:effectRef idx="0">
+            <a:schemeClr val="accent6"/>
+          </a:effectRef>
+          <a:fontRef idx="minor">
+            <a:schemeClr val="dk1"/>
+          </a:fontRef>
+        </p:style>
+        <p:txBody>
+          <a:bodyPr rtlCol="0" anchor="ctr"/>
+          <a:lstStyle/>
+          <a:p>
+            <a:pPr algn="ctr"/>
+            <a:endParaRPr lang="en-US"/>
+          </a:p>
+        </p:txBody>
+      </p:sp>
+      <p:sp>
+        <p:nvSpPr>
+          <p:cNvPr id="16" name="Oval 15">
+            <a:extLst>
+              <a:ext uri="{FF2B5EF4-FFF2-40B4-BE49-F238E27FC236}">
+                <a16:creationId xmlns:a16="http://schemas.microsoft.com/office/drawing/2014/main" id="{C28CCD2E-9232-4A55-BFD3-751AF3325F52}"/>
+              </a:ext>
+            </a:extLst>
+          </p:cNvPr>
+          <p:cNvSpPr/>
+          <p:nvPr/>
+        </p:nvSpPr>
+        <p:spPr>
+          <a:xfrm>
+            <a:off x="2670628" y="5822647"/>
+            <a:ext cx="685830" cy="355600"/>
+          </a:xfrm>
+          <a:prstGeom prst="ellipse">
+            <a:avLst/>
+          </a:prstGeom>
+          <a:noFill/>
+        </p:spPr>
+        <p:style>
+          <a:lnRef idx="2">
+            <a:schemeClr val="accent6"/>
+          </a:lnRef>
+          <a:fillRef idx="1">
+            <a:schemeClr val="lt1"/>
+          </a:fillRef>
+          <a:effectRef idx="0">
+            <a:schemeClr val="accent6"/>
+          </a:effectRef>
+          <a:fontRef idx="minor">
+            <a:schemeClr val="dk1"/>
+          </a:fontRef>
+        </p:style>
+        <p:txBody>
+          <a:bodyPr rtlCol="0" anchor="ctr"/>
+          <a:lstStyle/>
+          <a:p>
+            <a:pPr algn="ctr"/>
+            <a:endParaRPr lang="en-US"/>
+          </a:p>
+        </p:txBody>
+      </p:sp>
+      <p:sp>
+        <p:nvSpPr>
+          <p:cNvPr id="17" name="Oval 16">
+            <a:extLst>
+              <a:ext uri="{FF2B5EF4-FFF2-40B4-BE49-F238E27FC236}">
+                <a16:creationId xmlns:a16="http://schemas.microsoft.com/office/drawing/2014/main" id="{79134A4B-8218-4F15-B0FE-97AD8D6609A9}"/>
+              </a:ext>
+            </a:extLst>
+          </p:cNvPr>
+          <p:cNvSpPr/>
+          <p:nvPr/>
+        </p:nvSpPr>
+        <p:spPr>
+          <a:xfrm>
+            <a:off x="8940819" y="2198914"/>
+            <a:ext cx="685830" cy="355600"/>
+          </a:xfrm>
+          <a:prstGeom prst="ellipse">
+            <a:avLst/>
+          </a:prstGeom>
+          <a:noFill/>
+        </p:spPr>
+        <p:style>
+          <a:lnRef idx="2">
+            <a:schemeClr val="accent6"/>
+          </a:lnRef>
+          <a:fillRef idx="1">
+            <a:schemeClr val="lt1"/>
+          </a:fillRef>
+          <a:effectRef idx="0">
+            <a:schemeClr val="accent6"/>
+          </a:effectRef>
+          <a:fontRef idx="minor">
+            <a:schemeClr val="dk1"/>
+          </a:fontRef>
+        </p:style>
+        <p:txBody>
+          <a:bodyPr rtlCol="0" anchor="ctr"/>
+          <a:lstStyle/>
+          <a:p>
+            <a:pPr algn="ctr"/>
+            <a:endParaRPr lang="en-US"/>
+          </a:p>
+        </p:txBody>
+      </p:sp>
+      <p:sp>
+        <p:nvSpPr>
+          <p:cNvPr id="18" name="Oval 17">
+            <a:extLst>
+              <a:ext uri="{FF2B5EF4-FFF2-40B4-BE49-F238E27FC236}">
+                <a16:creationId xmlns:a16="http://schemas.microsoft.com/office/drawing/2014/main" id="{E2859A87-FB48-4DD0-8677-722F701C0327}"/>
+              </a:ext>
+            </a:extLst>
+          </p:cNvPr>
+          <p:cNvSpPr/>
+          <p:nvPr/>
+        </p:nvSpPr>
+        <p:spPr>
+          <a:xfrm>
+            <a:off x="8940819" y="5664200"/>
+            <a:ext cx="685830" cy="355600"/>
+          </a:xfrm>
+          <a:prstGeom prst="ellipse">
+            <a:avLst/>
+          </a:prstGeom>
+          <a:noFill/>
+        </p:spPr>
+        <p:style>
+          <a:lnRef idx="2">
+            <a:schemeClr val="accent6"/>
+          </a:lnRef>
+          <a:fillRef idx="1">
+            <a:schemeClr val="lt1"/>
+          </a:fillRef>
+          <a:effectRef idx="0">
+            <a:schemeClr val="accent6"/>
+          </a:effectRef>
+          <a:fontRef idx="minor">
+            <a:schemeClr val="dk1"/>
+          </a:fontRef>
+        </p:style>
+        <p:txBody>
+          <a:bodyPr rtlCol="0" anchor="ctr"/>
+          <a:lstStyle/>
+          <a:p>
+            <a:pPr algn="ctr"/>
+            <a:endParaRPr lang="en-US"/>
+          </a:p>
+        </p:txBody>
+      </p:sp>
+    </p:spTree>
+    <p:extLst>
+      <p:ext uri="{BB962C8B-B14F-4D97-AF65-F5344CB8AC3E}">
+        <p14:creationId xmlns:p14="http://schemas.microsoft.com/office/powerpoint/2010/main" val="598906154"/>
+      </p:ext>
+    </p:extLst>
+  </p:cSld>
+  <p:clrMapOvr>
+    <a:overrideClrMapping bg1="dk1" tx1="lt1" bg2="dk2" tx2="lt2" accent1="accent1" accent2="accent2" accent3="accent3" accent4="accent4" accent5="accent5" accent6="accent6" hlink="hlink" folHlink="folHlink"/>
+  </p:clrMapOvr>
+  <p:extLst>
+    <p:ext uri="{6950BFC3-D8DA-4A85-94F7-54DA5524770B}">
+      <p188:commentRel xmlns:p188="http://schemas.microsoft.com/office/powerpoint/2018/8/main" r:id="rId2"/>
+    </p:ext>
+  </p:extLst>
+</p:sld>
+</file>
+
 <file path=ppt/slides/slide2.xml><?xml version="1.0" encoding="utf-8"?>
 <p:sld xmlns:a="http://schemas.openxmlformats.org/drawingml/2006/main" xmlns:r="http://schemas.openxmlformats.org/officeDocument/2006/relationships" xmlns:p="http://schemas.openxmlformats.org/presentationml/2006/main">
   <p:cSld>

</xml_diff>